<commit_message>
Deployed 43883b0 with MkDocs version: 1.6.1
</commit_message>
<xml_diff>
--- a/assets/illustrations.pptx
+++ b/assets/illustrations.pptx
@@ -7,6 +7,7 @@
   <p:sldIdLst>
     <p:sldId id="256" r:id="rId2"/>
     <p:sldId id="257" r:id="rId3"/>
+    <p:sldId id="258" r:id="rId4"/>
   </p:sldIdLst>
   <p:sldSz cx="12192000" cy="6858000"/>
   <p:notesSz cx="6858000" cy="9144000"/>
@@ -105,6 +106,11 @@
       </a:defRPr>
     </a:lvl9pPr>
   </p:defaultTextStyle>
+  <p:extLst>
+    <p:ext uri="{EFAFB233-063F-42B5-8137-9DF3F51BA10A}">
+      <p15:sldGuideLst xmlns:p15="http://schemas.microsoft.com/office/powerpoint/2012/main"/>
+    </p:ext>
+  </p:extLst>
 </p:presentation>
 </file>
 
@@ -255,7 +261,7 @@
           <a:p>
             <a:fld id="{B6EBD849-BF62-3E41-9392-B52349D77D8A}" type="datetimeFigureOut">
               <a:rPr lang="en-US" smtClean="0"/>
-              <a:t>1/1/26</a:t>
+              <a:t>1/21/26</a:t>
             </a:fld>
             <a:endParaRPr lang="en-US"/>
           </a:p>
@@ -453,7 +459,7 @@
           <a:p>
             <a:fld id="{B6EBD849-BF62-3E41-9392-B52349D77D8A}" type="datetimeFigureOut">
               <a:rPr lang="en-US" smtClean="0"/>
-              <a:t>1/1/26</a:t>
+              <a:t>1/21/26</a:t>
             </a:fld>
             <a:endParaRPr lang="en-US"/>
           </a:p>
@@ -661,7 +667,7 @@
           <a:p>
             <a:fld id="{B6EBD849-BF62-3E41-9392-B52349D77D8A}" type="datetimeFigureOut">
               <a:rPr lang="en-US" smtClean="0"/>
-              <a:t>1/1/26</a:t>
+              <a:t>1/21/26</a:t>
             </a:fld>
             <a:endParaRPr lang="en-US"/>
           </a:p>
@@ -859,7 +865,7 @@
           <a:p>
             <a:fld id="{B6EBD849-BF62-3E41-9392-B52349D77D8A}" type="datetimeFigureOut">
               <a:rPr lang="en-US" smtClean="0"/>
-              <a:t>1/1/26</a:t>
+              <a:t>1/21/26</a:t>
             </a:fld>
             <a:endParaRPr lang="en-US"/>
           </a:p>
@@ -1134,7 +1140,7 @@
           <a:p>
             <a:fld id="{B6EBD849-BF62-3E41-9392-B52349D77D8A}" type="datetimeFigureOut">
               <a:rPr lang="en-US" smtClean="0"/>
-              <a:t>1/1/26</a:t>
+              <a:t>1/21/26</a:t>
             </a:fld>
             <a:endParaRPr lang="en-US"/>
           </a:p>
@@ -1399,7 +1405,7 @@
           <a:p>
             <a:fld id="{B6EBD849-BF62-3E41-9392-B52349D77D8A}" type="datetimeFigureOut">
               <a:rPr lang="en-US" smtClean="0"/>
-              <a:t>1/1/26</a:t>
+              <a:t>1/21/26</a:t>
             </a:fld>
             <a:endParaRPr lang="en-US"/>
           </a:p>
@@ -1811,7 +1817,7 @@
           <a:p>
             <a:fld id="{B6EBD849-BF62-3E41-9392-B52349D77D8A}" type="datetimeFigureOut">
               <a:rPr lang="en-US" smtClean="0"/>
-              <a:t>1/1/26</a:t>
+              <a:t>1/21/26</a:t>
             </a:fld>
             <a:endParaRPr lang="en-US"/>
           </a:p>
@@ -1952,7 +1958,7 @@
           <a:p>
             <a:fld id="{B6EBD849-BF62-3E41-9392-B52349D77D8A}" type="datetimeFigureOut">
               <a:rPr lang="en-US" smtClean="0"/>
-              <a:t>1/1/26</a:t>
+              <a:t>1/21/26</a:t>
             </a:fld>
             <a:endParaRPr lang="en-US"/>
           </a:p>
@@ -2065,7 +2071,7 @@
           <a:p>
             <a:fld id="{B6EBD849-BF62-3E41-9392-B52349D77D8A}" type="datetimeFigureOut">
               <a:rPr lang="en-US" smtClean="0"/>
-              <a:t>1/1/26</a:t>
+              <a:t>1/21/26</a:t>
             </a:fld>
             <a:endParaRPr lang="en-US"/>
           </a:p>
@@ -2376,7 +2382,7 @@
           <a:p>
             <a:fld id="{B6EBD849-BF62-3E41-9392-B52349D77D8A}" type="datetimeFigureOut">
               <a:rPr lang="en-US" smtClean="0"/>
-              <a:t>1/1/26</a:t>
+              <a:t>1/21/26</a:t>
             </a:fld>
             <a:endParaRPr lang="en-US"/>
           </a:p>
@@ -2664,7 +2670,7 @@
           <a:p>
             <a:fld id="{B6EBD849-BF62-3E41-9392-B52349D77D8A}" type="datetimeFigureOut">
               <a:rPr lang="en-US" smtClean="0"/>
-              <a:t>1/1/26</a:t>
+              <a:t>1/21/26</a:t>
             </a:fld>
             <a:endParaRPr lang="en-US"/>
           </a:p>
@@ -2905,7 +2911,7 @@
           <a:p>
             <a:fld id="{B6EBD849-BF62-3E41-9392-B52349D77D8A}" type="datetimeFigureOut">
               <a:rPr lang="en-US" smtClean="0"/>
-              <a:t>1/1/26</a:t>
+              <a:t>1/21/26</a:t>
             </a:fld>
             <a:endParaRPr lang="en-US"/>
           </a:p>
@@ -4217,7 +4223,7 @@
         </p:blipFill>
         <p:spPr>
           <a:xfrm>
-            <a:off x="2917934" y="1264256"/>
+            <a:off x="2917934" y="1997909"/>
             <a:ext cx="678524" cy="678524"/>
           </a:xfrm>
           <a:prstGeom prst="rect">
@@ -4253,7 +4259,7 @@
         </p:blipFill>
         <p:spPr>
           <a:xfrm>
-            <a:off x="4750330" y="1324215"/>
+            <a:off x="4750330" y="2057868"/>
             <a:ext cx="1237130" cy="1237130"/>
           </a:xfrm>
           <a:prstGeom prst="rect">
@@ -4289,7 +4295,7 @@
         </p:blipFill>
         <p:spPr>
           <a:xfrm>
-            <a:off x="7664393" y="1483705"/>
+            <a:off x="7664393" y="1887747"/>
             <a:ext cx="926974" cy="926974"/>
           </a:xfrm>
           <a:prstGeom prst="rect">
@@ -4325,7 +4331,7 @@
         </p:blipFill>
         <p:spPr>
           <a:xfrm>
-            <a:off x="7693202" y="3288678"/>
+            <a:off x="7693202" y="3692720"/>
             <a:ext cx="926974" cy="926974"/>
           </a:xfrm>
           <a:prstGeom prst="rect">
@@ -4361,7 +4367,7 @@
         </p:blipFill>
         <p:spPr>
           <a:xfrm>
-            <a:off x="7706925" y="5021579"/>
+            <a:off x="7706925" y="5425621"/>
             <a:ext cx="926974" cy="926974"/>
           </a:xfrm>
           <a:prstGeom prst="rect">
@@ -4383,7 +4389,7 @@
         </p:nvSpPr>
         <p:spPr>
           <a:xfrm>
-            <a:off x="6941941" y="2390829"/>
+            <a:off x="6941941" y="2794871"/>
             <a:ext cx="2344432" cy="369332"/>
           </a:xfrm>
           <a:prstGeom prst="rect">
@@ -4427,7 +4433,7 @@
         </p:nvSpPr>
         <p:spPr>
           <a:xfrm>
-            <a:off x="6984473" y="4202206"/>
+            <a:off x="6984473" y="4606248"/>
             <a:ext cx="2344432" cy="369332"/>
           </a:xfrm>
           <a:prstGeom prst="rect">
@@ -4470,7 +4476,7 @@
         </p:nvSpPr>
         <p:spPr>
           <a:xfrm>
-            <a:off x="6984473" y="5896074"/>
+            <a:off x="6984473" y="6300116"/>
             <a:ext cx="2344432" cy="369332"/>
           </a:xfrm>
           <a:prstGeom prst="rect">
@@ -4515,7 +4521,7 @@
         </p:nvCxnSpPr>
         <p:spPr>
           <a:xfrm>
-            <a:off x="5932007" y="1926772"/>
+            <a:off x="5932007" y="2660425"/>
             <a:ext cx="1128012" cy="0"/>
           </a:xfrm>
           <a:prstGeom prst="straightConnector1">
@@ -4560,7 +4566,7 @@
         </p:nvCxnSpPr>
         <p:spPr>
           <a:xfrm>
-            <a:off x="9186530" y="2097313"/>
+            <a:off x="9186530" y="2501355"/>
             <a:ext cx="691117" cy="0"/>
           </a:xfrm>
           <a:prstGeom prst="straightConnector1">
@@ -4617,7 +4623,7 @@
         </p:blipFill>
         <p:spPr>
           <a:xfrm>
-            <a:off x="10508827" y="1438092"/>
+            <a:off x="10508827" y="1842134"/>
             <a:ext cx="914400" cy="914400"/>
           </a:xfrm>
           <a:prstGeom prst="rect">
@@ -4653,7 +4659,7 @@
         </p:blipFill>
         <p:spPr>
           <a:xfrm>
-            <a:off x="10661227" y="1590492"/>
+            <a:off x="10661227" y="1994534"/>
             <a:ext cx="914400" cy="914400"/>
           </a:xfrm>
           <a:prstGeom prst="rect">
@@ -4675,7 +4681,7 @@
         </p:nvSpPr>
         <p:spPr>
           <a:xfrm>
-            <a:off x="10327211" y="2572128"/>
+            <a:off x="10494219" y="2979537"/>
             <a:ext cx="1248416" cy="646331"/>
           </a:xfrm>
           <a:prstGeom prst="rect">
@@ -4697,7 +4703,7 @@
                 </a:solidFill>
                 <a:latin typeface="Avenir Book" panose="02000503020000020003" pitchFamily="2" charset="0"/>
               </a:rPr>
-              <a:t>Your Agents</a:t>
+              <a:t>Your AI Agents</a:t>
             </a:r>
           </a:p>
         </p:txBody>
@@ -4718,7 +4724,7 @@
         </p:nvCxnSpPr>
         <p:spPr>
           <a:xfrm>
-            <a:off x="5987460" y="2378850"/>
+            <a:off x="5987460" y="3112503"/>
             <a:ext cx="1516000" cy="1373315"/>
           </a:xfrm>
           <a:prstGeom prst="straightConnector1">
@@ -4764,7 +4770,7 @@
         </p:nvCxnSpPr>
         <p:spPr>
           <a:xfrm>
-            <a:off x="5706104" y="2635287"/>
+            <a:off x="5706104" y="3368940"/>
             <a:ext cx="1797356" cy="2849779"/>
           </a:xfrm>
           <a:prstGeom prst="straightConnector1">
@@ -4808,7 +4814,7 @@
         </p:nvSpPr>
         <p:spPr>
           <a:xfrm>
-            <a:off x="2245259" y="2009518"/>
+            <a:off x="2245259" y="2743171"/>
             <a:ext cx="1936376" cy="369332"/>
           </a:xfrm>
           <a:prstGeom prst="rect">
@@ -4851,7 +4857,7 @@
         </p:nvSpPr>
         <p:spPr>
           <a:xfrm>
-            <a:off x="4400707" y="1063492"/>
+            <a:off x="4400707" y="1797145"/>
             <a:ext cx="1936376" cy="369332"/>
           </a:xfrm>
           <a:prstGeom prst="rect">
@@ -4892,7 +4898,7 @@
         </p:nvSpPr>
         <p:spPr>
           <a:xfrm rot="5400000">
-            <a:off x="9478334" y="1875926"/>
+            <a:off x="9478334" y="2279968"/>
             <a:ext cx="1514417" cy="410995"/>
           </a:xfrm>
           <a:prstGeom prst="roundRect">
@@ -4957,8 +4963,8 @@
         </p:nvSpPr>
         <p:spPr>
           <a:xfrm>
-            <a:off x="7455747" y="292940"/>
-            <a:ext cx="1380618" cy="410995"/>
+            <a:off x="7455747" y="445702"/>
+            <a:ext cx="1380618" cy="662275"/>
           </a:xfrm>
           <a:prstGeom prst="roundRect">
             <a:avLst/>
@@ -5003,7 +5009,7 @@
                   </a:schemeClr>
                 </a:solidFill>
               </a:rPr>
-              <a:t>Xians UI</a:t>
+              <a:t>Xians Dev Portal</a:t>
             </a:r>
           </a:p>
         </p:txBody>
@@ -5024,7 +5030,7 @@
         </p:nvCxnSpPr>
         <p:spPr>
           <a:xfrm>
-            <a:off x="8142838" y="787509"/>
+            <a:off x="8142838" y="1191551"/>
             <a:ext cx="0" cy="483541"/>
           </a:xfrm>
           <a:prstGeom prst="straightConnector1">
@@ -5070,7 +5076,7 @@
         </p:nvCxnSpPr>
         <p:spPr>
           <a:xfrm>
-            <a:off x="2048438" y="1942780"/>
+            <a:off x="2048438" y="2676433"/>
             <a:ext cx="2701892" cy="0"/>
           </a:xfrm>
           <a:prstGeom prst="straightConnector1">
@@ -5127,7 +5133,7 @@
         </p:blipFill>
         <p:spPr>
           <a:xfrm>
-            <a:off x="590705" y="1361356"/>
+            <a:off x="590705" y="2095009"/>
             <a:ext cx="1237130" cy="1237130"/>
           </a:xfrm>
           <a:prstGeom prst="rect">
@@ -5149,8 +5155,8 @@
         </p:nvSpPr>
         <p:spPr>
           <a:xfrm>
-            <a:off x="241082" y="2561344"/>
-            <a:ext cx="1936376" cy="369332"/>
+            <a:off x="241082" y="3294997"/>
+            <a:ext cx="1936376" cy="276999"/>
           </a:xfrm>
           <a:prstGeom prst="rect">
             <a:avLst/>
@@ -5165,7 +5171,7 @@
           <a:p>
             <a:pPr algn="ctr"/>
             <a:r>
-              <a:rPr lang="en-US" dirty="0">
+              <a:rPr lang="en-US" sz="1200" dirty="0">
                 <a:solidFill>
                   <a:schemeClr val="bg1"/>
                 </a:solidFill>
@@ -5190,7 +5196,7 @@
         </p:nvSpPr>
         <p:spPr>
           <a:xfrm>
-            <a:off x="7276915" y="1358831"/>
+            <a:off x="7276915" y="1762873"/>
             <a:ext cx="1757193" cy="1479801"/>
           </a:xfrm>
           <a:prstGeom prst="roundRect">
@@ -5240,10 +5246,1089 @@
           </a:p>
         </p:txBody>
       </p:sp>
+      <p:sp>
+        <p:nvSpPr>
+          <p:cNvPr id="2" name="Rounded Rectangle 1">
+            <a:extLst>
+              <a:ext uri="{FF2B5EF4-FFF2-40B4-BE49-F238E27FC236}">
+                <a16:creationId xmlns:a16="http://schemas.microsoft.com/office/drawing/2014/main" id="{2AF94583-50B7-15DF-FF90-51C9C688B054}"/>
+              </a:ext>
+            </a:extLst>
+          </p:cNvPr>
+          <p:cNvSpPr/>
+          <p:nvPr/>
+        </p:nvSpPr>
+        <p:spPr>
+          <a:xfrm>
+            <a:off x="527440" y="445701"/>
+            <a:ext cx="1586753" cy="662275"/>
+          </a:xfrm>
+          <a:prstGeom prst="roundRect">
+            <a:avLst/>
+          </a:prstGeom>
+          <a:noFill/>
+          <a:ln>
+            <a:solidFill>
+              <a:schemeClr val="tx2">
+                <a:lumMod val="25000"/>
+                <a:lumOff val="75000"/>
+              </a:schemeClr>
+            </a:solidFill>
+          </a:ln>
+        </p:spPr>
+        <p:style>
+          <a:lnRef idx="2">
+            <a:schemeClr val="accent1">
+              <a:shade val="15000"/>
+            </a:schemeClr>
+          </a:lnRef>
+          <a:fillRef idx="1">
+            <a:schemeClr val="accent1"/>
+          </a:fillRef>
+          <a:effectRef idx="0">
+            <a:schemeClr val="accent1"/>
+          </a:effectRef>
+          <a:fontRef idx="minor">
+            <a:schemeClr val="lt1"/>
+          </a:fontRef>
+        </p:style>
+        <p:txBody>
+          <a:bodyPr rtlCol="0" anchor="ctr"/>
+          <a:lstStyle/>
+          <a:p>
+            <a:pPr algn="ctr"/>
+            <a:r>
+              <a:rPr lang="en-US" dirty="0">
+                <a:solidFill>
+                  <a:schemeClr val="tx2">
+                    <a:lumMod val="25000"/>
+                    <a:lumOff val="75000"/>
+                  </a:schemeClr>
+                </a:solidFill>
+              </a:rPr>
+              <a:t>Xians Agent Studio</a:t>
+            </a:r>
+          </a:p>
+        </p:txBody>
+      </p:sp>
+      <p:sp>
+        <p:nvSpPr>
+          <p:cNvPr id="6" name="TextBox 5">
+            <a:extLst>
+              <a:ext uri="{FF2B5EF4-FFF2-40B4-BE49-F238E27FC236}">
+                <a16:creationId xmlns:a16="http://schemas.microsoft.com/office/drawing/2014/main" id="{23BAF62D-7F71-6BEA-067C-D5F86BCC424F}"/>
+              </a:ext>
+            </a:extLst>
+          </p:cNvPr>
+          <p:cNvSpPr txBox="1"/>
+          <p:nvPr/>
+        </p:nvSpPr>
+        <p:spPr>
+          <a:xfrm>
+            <a:off x="-114268" y="1201749"/>
+            <a:ext cx="2870171" cy="461665"/>
+          </a:xfrm>
+          <a:prstGeom prst="rect">
+            <a:avLst/>
+          </a:prstGeom>
+          <a:noFill/>
+        </p:spPr>
+        <p:txBody>
+          <a:bodyPr wrap="square" rtlCol="0">
+            <a:spAutoFit/>
+          </a:bodyPr>
+          <a:lstStyle/>
+          <a:p>
+            <a:pPr algn="ctr"/>
+            <a:r>
+              <a:rPr lang="en-US" sz="1200" dirty="0">
+                <a:solidFill>
+                  <a:schemeClr val="bg1"/>
+                </a:solidFill>
+                <a:latin typeface="Avenir Book" panose="02000503020000020003" pitchFamily="2" charset="0"/>
+              </a:rPr>
+              <a:t>Optional UI for </a:t>
+            </a:r>
+          </a:p>
+          <a:p>
+            <a:pPr algn="ctr"/>
+            <a:r>
+              <a:rPr lang="en-US" sz="1200" dirty="0">
+                <a:solidFill>
+                  <a:schemeClr val="bg1"/>
+                </a:solidFill>
+                <a:latin typeface="Avenir Book" panose="02000503020000020003" pitchFamily="2" charset="0"/>
+              </a:rPr>
+              <a:t>user-agent interaction</a:t>
+            </a:r>
+          </a:p>
+        </p:txBody>
+      </p:sp>
+      <p:cxnSp>
+        <p:nvCxnSpPr>
+          <p:cNvPr id="19" name="Elbow Connector 18">
+            <a:extLst>
+              <a:ext uri="{FF2B5EF4-FFF2-40B4-BE49-F238E27FC236}">
+                <a16:creationId xmlns:a16="http://schemas.microsoft.com/office/drawing/2014/main" id="{EB6C7087-6ED9-C0E9-AD7F-9B2FFC4E769F}"/>
+              </a:ext>
+            </a:extLst>
+          </p:cNvPr>
+          <p:cNvCxnSpPr>
+            <a:cxnSpLocks/>
+          </p:cNvCxnSpPr>
+          <p:nvPr/>
+        </p:nvCxnSpPr>
+        <p:spPr>
+          <a:xfrm>
+            <a:off x="2352720" y="767110"/>
+            <a:ext cx="4771773" cy="1384248"/>
+          </a:xfrm>
+          <a:prstGeom prst="bentConnector3">
+            <a:avLst>
+              <a:gd name="adj1" fmla="val 90776"/>
+            </a:avLst>
+          </a:prstGeom>
+          <a:ln>
+            <a:solidFill>
+              <a:schemeClr val="tx2">
+                <a:lumMod val="25000"/>
+                <a:lumOff val="75000"/>
+              </a:schemeClr>
+            </a:solidFill>
+            <a:headEnd type="triangle"/>
+            <a:tailEnd type="triangle"/>
+          </a:ln>
+        </p:spPr>
+        <p:style>
+          <a:lnRef idx="2">
+            <a:schemeClr val="accent1"/>
+          </a:lnRef>
+          <a:fillRef idx="0">
+            <a:schemeClr val="accent1"/>
+          </a:fillRef>
+          <a:effectRef idx="1">
+            <a:schemeClr val="accent1"/>
+          </a:effectRef>
+          <a:fontRef idx="minor">
+            <a:schemeClr val="tx1"/>
+          </a:fontRef>
+        </p:style>
+      </p:cxnSp>
     </p:spTree>
     <p:extLst>
       <p:ext uri="{BB962C8B-B14F-4D97-AF65-F5344CB8AC3E}">
         <p14:creationId xmlns:p14="http://schemas.microsoft.com/office/powerpoint/2010/main" val="556708516"/>
+      </p:ext>
+    </p:extLst>
+  </p:cSld>
+  <p:clrMapOvr>
+    <a:masterClrMapping/>
+  </p:clrMapOvr>
+</p:sld>
+</file>
+
+<file path=ppt/slides/slide3.xml><?xml version="1.0" encoding="utf-8"?>
+<p:sld xmlns:a="http://schemas.openxmlformats.org/drawingml/2006/main" xmlns:r="http://schemas.openxmlformats.org/officeDocument/2006/relationships" xmlns:p="http://schemas.openxmlformats.org/presentationml/2006/main">
+  <p:cSld>
+    <p:bg>
+      <p:bgPr>
+        <a:solidFill>
+          <a:schemeClr val="tx1">
+            <a:lumMod val="85000"/>
+            <a:lumOff val="15000"/>
+          </a:schemeClr>
+        </a:solidFill>
+        <a:effectLst/>
+      </p:bgPr>
+    </p:bg>
+    <p:spTree>
+      <p:nvGrpSpPr>
+        <p:cNvPr id="1" name="">
+          <a:extLst>
+            <a:ext uri="{FF2B5EF4-FFF2-40B4-BE49-F238E27FC236}">
+              <a16:creationId xmlns:a16="http://schemas.microsoft.com/office/drawing/2014/main" id="{CCFF001B-96E2-8702-077A-3D5236B2A731}"/>
+            </a:ext>
+          </a:extLst>
+        </p:cNvPr>
+        <p:cNvGrpSpPr/>
+        <p:nvPr/>
+      </p:nvGrpSpPr>
+      <p:grpSpPr>
+        <a:xfrm>
+          <a:off x="0" y="0"/>
+          <a:ext cx="0" cy="0"/>
+          <a:chOff x="0" y="0"/>
+          <a:chExt cx="0" cy="0"/>
+        </a:xfrm>
+      </p:grpSpPr>
+      <p:sp>
+        <p:nvSpPr>
+          <p:cNvPr id="9" name="Rounded Rectangle 8">
+            <a:extLst>
+              <a:ext uri="{FF2B5EF4-FFF2-40B4-BE49-F238E27FC236}">
+                <a16:creationId xmlns:a16="http://schemas.microsoft.com/office/drawing/2014/main" id="{69AA2EB6-B33F-5F73-450A-361C3092D41A}"/>
+              </a:ext>
+            </a:extLst>
+          </p:cNvPr>
+          <p:cNvSpPr/>
+          <p:nvPr/>
+        </p:nvSpPr>
+        <p:spPr>
+          <a:xfrm rot="16200000">
+            <a:off x="5766544" y="4044164"/>
+            <a:ext cx="2546702" cy="662275"/>
+          </a:xfrm>
+          <a:prstGeom prst="roundRect">
+            <a:avLst/>
+          </a:prstGeom>
+          <a:noFill/>
+          <a:ln>
+            <a:solidFill>
+              <a:schemeClr val="tx2">
+                <a:lumMod val="25000"/>
+                <a:lumOff val="75000"/>
+              </a:schemeClr>
+            </a:solidFill>
+          </a:ln>
+        </p:spPr>
+        <p:style>
+          <a:lnRef idx="2">
+            <a:schemeClr val="accent1">
+              <a:shade val="15000"/>
+            </a:schemeClr>
+          </a:lnRef>
+          <a:fillRef idx="1">
+            <a:schemeClr val="accent1"/>
+          </a:fillRef>
+          <a:effectRef idx="0">
+            <a:schemeClr val="accent1"/>
+          </a:effectRef>
+          <a:fontRef idx="minor">
+            <a:schemeClr val="lt1"/>
+          </a:fontRef>
+        </p:style>
+        <p:txBody>
+          <a:bodyPr rtlCol="0" anchor="ctr"/>
+          <a:lstStyle/>
+          <a:p>
+            <a:pPr algn="ctr"/>
+            <a:r>
+              <a:rPr lang="en-US" dirty="0">
+                <a:solidFill>
+                  <a:schemeClr val="tx2">
+                    <a:lumMod val="25000"/>
+                    <a:lumOff val="75000"/>
+                  </a:schemeClr>
+                </a:solidFill>
+              </a:rPr>
+              <a:t>Agent A</a:t>
+            </a:r>
+          </a:p>
+        </p:txBody>
+      </p:sp>
+      <p:sp>
+        <p:nvSpPr>
+          <p:cNvPr id="2" name="Rounded Rectangle 1">
+            <a:extLst>
+              <a:ext uri="{FF2B5EF4-FFF2-40B4-BE49-F238E27FC236}">
+                <a16:creationId xmlns:a16="http://schemas.microsoft.com/office/drawing/2014/main" id="{E046861A-2C95-3BE1-2A05-9BF66C4E3BA5}"/>
+              </a:ext>
+            </a:extLst>
+          </p:cNvPr>
+          <p:cNvSpPr/>
+          <p:nvPr/>
+        </p:nvSpPr>
+        <p:spPr>
+          <a:xfrm rot="16200000">
+            <a:off x="1981303" y="3618862"/>
+            <a:ext cx="3397308" cy="662275"/>
+          </a:xfrm>
+          <a:prstGeom prst="roundRect">
+            <a:avLst/>
+          </a:prstGeom>
+          <a:noFill/>
+          <a:ln>
+            <a:solidFill>
+              <a:schemeClr val="tx2">
+                <a:lumMod val="25000"/>
+                <a:lumOff val="75000"/>
+              </a:schemeClr>
+            </a:solidFill>
+          </a:ln>
+        </p:spPr>
+        <p:style>
+          <a:lnRef idx="2">
+            <a:schemeClr val="accent1">
+              <a:shade val="15000"/>
+            </a:schemeClr>
+          </a:lnRef>
+          <a:fillRef idx="1">
+            <a:schemeClr val="accent1"/>
+          </a:fillRef>
+          <a:effectRef idx="0">
+            <a:schemeClr val="accent1"/>
+          </a:effectRef>
+          <a:fontRef idx="minor">
+            <a:schemeClr val="lt1"/>
+          </a:fontRef>
+        </p:style>
+        <p:txBody>
+          <a:bodyPr rtlCol="0" anchor="ctr"/>
+          <a:lstStyle/>
+          <a:p>
+            <a:pPr algn="ctr"/>
+            <a:r>
+              <a:rPr lang="en-US" dirty="0">
+                <a:solidFill>
+                  <a:schemeClr val="tx2">
+                    <a:lumMod val="25000"/>
+                    <a:lumOff val="75000"/>
+                  </a:schemeClr>
+                </a:solidFill>
+              </a:rPr>
+              <a:t>Agent-Human Collaboration UI</a:t>
+            </a:r>
+          </a:p>
+        </p:txBody>
+      </p:sp>
+      <p:sp>
+        <p:nvSpPr>
+          <p:cNvPr id="3" name="Rounded Rectangle 2">
+            <a:extLst>
+              <a:ext uri="{FF2B5EF4-FFF2-40B4-BE49-F238E27FC236}">
+                <a16:creationId xmlns:a16="http://schemas.microsoft.com/office/drawing/2014/main" id="{8CD89C02-5794-8DBB-2DEA-D1349365628A}"/>
+              </a:ext>
+            </a:extLst>
+          </p:cNvPr>
+          <p:cNvSpPr/>
+          <p:nvPr/>
+        </p:nvSpPr>
+        <p:spPr>
+          <a:xfrm rot="16200000">
+            <a:off x="3118521" y="3097866"/>
+            <a:ext cx="4439297" cy="662275"/>
+          </a:xfrm>
+          <a:prstGeom prst="roundRect">
+            <a:avLst/>
+          </a:prstGeom>
+          <a:noFill/>
+          <a:ln>
+            <a:solidFill>
+              <a:schemeClr val="tx2">
+                <a:lumMod val="25000"/>
+                <a:lumOff val="75000"/>
+              </a:schemeClr>
+            </a:solidFill>
+          </a:ln>
+        </p:spPr>
+        <p:style>
+          <a:lnRef idx="2">
+            <a:schemeClr val="accent1">
+              <a:shade val="15000"/>
+            </a:schemeClr>
+          </a:lnRef>
+          <a:fillRef idx="1">
+            <a:schemeClr val="accent1"/>
+          </a:fillRef>
+          <a:effectRef idx="0">
+            <a:schemeClr val="accent1"/>
+          </a:effectRef>
+          <a:fontRef idx="minor">
+            <a:schemeClr val="lt1"/>
+          </a:fontRef>
+        </p:style>
+        <p:txBody>
+          <a:bodyPr rtlCol="0" anchor="ctr"/>
+          <a:lstStyle/>
+          <a:p>
+            <a:pPr algn="ctr"/>
+            <a:r>
+              <a:rPr lang="en-US" dirty="0">
+                <a:solidFill>
+                  <a:schemeClr val="tx2">
+                    <a:lumMod val="25000"/>
+                    <a:lumOff val="75000"/>
+                  </a:schemeClr>
+                </a:solidFill>
+              </a:rPr>
+              <a:t>Agent Control Plane (ACP) – E.g., Xians</a:t>
+            </a:r>
+          </a:p>
+        </p:txBody>
+      </p:sp>
+      <p:sp>
+        <p:nvSpPr>
+          <p:cNvPr id="5" name="Rounded Rectangle 4">
+            <a:extLst>
+              <a:ext uri="{FF2B5EF4-FFF2-40B4-BE49-F238E27FC236}">
+                <a16:creationId xmlns:a16="http://schemas.microsoft.com/office/drawing/2014/main" id="{EB7978B9-370A-8B9E-1650-A64BC34DA0EC}"/>
+              </a:ext>
+            </a:extLst>
+          </p:cNvPr>
+          <p:cNvSpPr/>
+          <p:nvPr/>
+        </p:nvSpPr>
+        <p:spPr>
+          <a:xfrm rot="16200000">
+            <a:off x="6205158" y="1712955"/>
+            <a:ext cx="1669477" cy="662275"/>
+          </a:xfrm>
+          <a:prstGeom prst="roundRect">
+            <a:avLst/>
+          </a:prstGeom>
+          <a:noFill/>
+          <a:ln>
+            <a:solidFill>
+              <a:schemeClr val="tx2">
+                <a:lumMod val="25000"/>
+                <a:lumOff val="75000"/>
+              </a:schemeClr>
+            </a:solidFill>
+          </a:ln>
+        </p:spPr>
+        <p:style>
+          <a:lnRef idx="2">
+            <a:schemeClr val="accent1">
+              <a:shade val="15000"/>
+            </a:schemeClr>
+          </a:lnRef>
+          <a:fillRef idx="1">
+            <a:schemeClr val="accent1"/>
+          </a:fillRef>
+          <a:effectRef idx="0">
+            <a:schemeClr val="accent1"/>
+          </a:effectRef>
+          <a:fontRef idx="minor">
+            <a:schemeClr val="lt1"/>
+          </a:fontRef>
+        </p:style>
+        <p:txBody>
+          <a:bodyPr rtlCol="0" anchor="ctr"/>
+          <a:lstStyle/>
+          <a:p>
+            <a:pPr algn="ctr"/>
+            <a:r>
+              <a:rPr lang="en-US" dirty="0">
+                <a:solidFill>
+                  <a:schemeClr val="tx2">
+                    <a:lumMod val="25000"/>
+                    <a:lumOff val="75000"/>
+                  </a:schemeClr>
+                </a:solidFill>
+              </a:rPr>
+              <a:t>Agent B</a:t>
+            </a:r>
+          </a:p>
+        </p:txBody>
+      </p:sp>
+      <p:sp>
+        <p:nvSpPr>
+          <p:cNvPr id="18" name="Rounded Rectangle 17">
+            <a:extLst>
+              <a:ext uri="{FF2B5EF4-FFF2-40B4-BE49-F238E27FC236}">
+                <a16:creationId xmlns:a16="http://schemas.microsoft.com/office/drawing/2014/main" id="{440785FA-6B73-96E1-6617-FF1D98C0411C}"/>
+              </a:ext>
+            </a:extLst>
+          </p:cNvPr>
+          <p:cNvSpPr/>
+          <p:nvPr/>
+        </p:nvSpPr>
+        <p:spPr>
+          <a:xfrm rot="16200000">
+            <a:off x="5748825" y="3097863"/>
+            <a:ext cx="4439298" cy="662275"/>
+          </a:xfrm>
+          <a:prstGeom prst="roundRect">
+            <a:avLst/>
+          </a:prstGeom>
+          <a:noFill/>
+          <a:ln>
+            <a:solidFill>
+              <a:schemeClr val="tx2">
+                <a:lumMod val="25000"/>
+                <a:lumOff val="75000"/>
+              </a:schemeClr>
+            </a:solidFill>
+          </a:ln>
+        </p:spPr>
+        <p:style>
+          <a:lnRef idx="2">
+            <a:schemeClr val="accent1">
+              <a:shade val="15000"/>
+            </a:schemeClr>
+          </a:lnRef>
+          <a:fillRef idx="1">
+            <a:schemeClr val="accent1"/>
+          </a:fillRef>
+          <a:effectRef idx="0">
+            <a:schemeClr val="accent1"/>
+          </a:effectRef>
+          <a:fontRef idx="minor">
+            <a:schemeClr val="lt1"/>
+          </a:fontRef>
+        </p:style>
+        <p:txBody>
+          <a:bodyPr rtlCol="0" anchor="ctr"/>
+          <a:lstStyle/>
+          <a:p>
+            <a:pPr algn="ctr"/>
+            <a:r>
+              <a:rPr lang="en-US" dirty="0">
+                <a:solidFill>
+                  <a:schemeClr val="tx2">
+                    <a:lumMod val="25000"/>
+                    <a:lumOff val="75000"/>
+                  </a:schemeClr>
+                </a:solidFill>
+              </a:rPr>
+              <a:t>Tools &amp; MCPs</a:t>
+            </a:r>
+          </a:p>
+        </p:txBody>
+      </p:sp>
+      <p:sp>
+        <p:nvSpPr>
+          <p:cNvPr id="31" name="Rounded Rectangle 30">
+            <a:extLst>
+              <a:ext uri="{FF2B5EF4-FFF2-40B4-BE49-F238E27FC236}">
+                <a16:creationId xmlns:a16="http://schemas.microsoft.com/office/drawing/2014/main" id="{F970CC0E-109F-D554-DDE5-95E8BA004D5A}"/>
+              </a:ext>
+            </a:extLst>
+          </p:cNvPr>
+          <p:cNvSpPr/>
+          <p:nvPr/>
+        </p:nvSpPr>
+        <p:spPr>
+          <a:xfrm rot="16200000">
+            <a:off x="9090993" y="4044162"/>
+            <a:ext cx="2546701" cy="662275"/>
+          </a:xfrm>
+          <a:prstGeom prst="roundRect">
+            <a:avLst/>
+          </a:prstGeom>
+          <a:noFill/>
+          <a:ln>
+            <a:solidFill>
+              <a:schemeClr val="tx2">
+                <a:lumMod val="25000"/>
+                <a:lumOff val="75000"/>
+              </a:schemeClr>
+            </a:solidFill>
+          </a:ln>
+        </p:spPr>
+        <p:style>
+          <a:lnRef idx="2">
+            <a:schemeClr val="accent1">
+              <a:shade val="15000"/>
+            </a:schemeClr>
+          </a:lnRef>
+          <a:fillRef idx="1">
+            <a:schemeClr val="accent1"/>
+          </a:fillRef>
+          <a:effectRef idx="0">
+            <a:schemeClr val="accent1"/>
+          </a:effectRef>
+          <a:fontRef idx="minor">
+            <a:schemeClr val="lt1"/>
+          </a:fontRef>
+        </p:style>
+        <p:txBody>
+          <a:bodyPr rtlCol="0" anchor="ctr"/>
+          <a:lstStyle/>
+          <a:p>
+            <a:pPr algn="ctr"/>
+            <a:r>
+              <a:rPr lang="en-US" dirty="0">
+                <a:solidFill>
+                  <a:schemeClr val="tx2">
+                    <a:lumMod val="25000"/>
+                    <a:lumOff val="75000"/>
+                  </a:schemeClr>
+                </a:solidFill>
+              </a:rPr>
+              <a:t>Back Office Systems/APIs</a:t>
+            </a:r>
+          </a:p>
+        </p:txBody>
+      </p:sp>
+      <p:pic>
+        <p:nvPicPr>
+          <p:cNvPr id="33" name="Graphic 32" descr="Internet Of Things outline">
+            <a:extLst>
+              <a:ext uri="{FF2B5EF4-FFF2-40B4-BE49-F238E27FC236}">
+                <a16:creationId xmlns:a16="http://schemas.microsoft.com/office/drawing/2014/main" id="{D234726E-8D13-499F-CA4A-7283082D142B}"/>
+              </a:ext>
+            </a:extLst>
+          </p:cNvPr>
+          <p:cNvPicPr>
+            <a:picLocks noChangeAspect="1"/>
+          </p:cNvPicPr>
+          <p:nvPr/>
+        </p:nvPicPr>
+        <p:blipFill>
+          <a:blip r:embed="rId2">
+            <a:extLst>
+              <a:ext uri="{96DAC541-7B7A-43D3-8B79-37D633B846F1}">
+                <asvg:svgBlip xmlns:asvg="http://schemas.microsoft.com/office/drawing/2016/SVG/main" r:embed="rId3"/>
+              </a:ext>
+            </a:extLst>
+          </a:blip>
+          <a:stretch>
+            <a:fillRect/>
+          </a:stretch>
+        </p:blipFill>
+        <p:spPr>
+          <a:xfrm rot="16200000">
+            <a:off x="1100368" y="1129413"/>
+            <a:ext cx="914400" cy="914400"/>
+          </a:xfrm>
+          <a:prstGeom prst="rect">
+            <a:avLst/>
+          </a:prstGeom>
+        </p:spPr>
+      </p:pic>
+      <p:pic>
+        <p:nvPicPr>
+          <p:cNvPr id="37" name="Graphic 36" descr="Artificial Intelligence outline">
+            <a:extLst>
+              <a:ext uri="{FF2B5EF4-FFF2-40B4-BE49-F238E27FC236}">
+                <a16:creationId xmlns:a16="http://schemas.microsoft.com/office/drawing/2014/main" id="{4EA3E6CE-081F-DD5C-5674-F56A40AFD7D4}"/>
+              </a:ext>
+            </a:extLst>
+          </p:cNvPr>
+          <p:cNvPicPr>
+            <a:picLocks noChangeAspect="1"/>
+          </p:cNvPicPr>
+          <p:nvPr/>
+        </p:nvPicPr>
+        <p:blipFill>
+          <a:blip r:embed="rId4">
+            <a:extLst>
+              <a:ext uri="{96DAC541-7B7A-43D3-8B79-37D633B846F1}">
+                <asvg:svgBlip xmlns:asvg="http://schemas.microsoft.com/office/drawing/2016/SVG/main" r:embed="rId5"/>
+              </a:ext>
+            </a:extLst>
+          </a:blip>
+          <a:stretch>
+            <a:fillRect/>
+          </a:stretch>
+        </p:blipFill>
+        <p:spPr>
+          <a:xfrm rot="16200000">
+            <a:off x="6764757" y="4963961"/>
+            <a:ext cx="550275" cy="550275"/>
+          </a:xfrm>
+          <a:prstGeom prst="rect">
+            <a:avLst/>
+          </a:prstGeom>
+        </p:spPr>
+      </p:pic>
+      <p:pic>
+        <p:nvPicPr>
+          <p:cNvPr id="39" name="Graphic 38" descr="Users outline">
+            <a:extLst>
+              <a:ext uri="{FF2B5EF4-FFF2-40B4-BE49-F238E27FC236}">
+                <a16:creationId xmlns:a16="http://schemas.microsoft.com/office/drawing/2014/main" id="{0EB11630-1E93-8BD6-60A8-7392D2E9C298}"/>
+              </a:ext>
+            </a:extLst>
+          </p:cNvPr>
+          <p:cNvPicPr>
+            <a:picLocks noChangeAspect="1"/>
+          </p:cNvPicPr>
+          <p:nvPr/>
+        </p:nvPicPr>
+        <p:blipFill>
+          <a:blip r:embed="rId6">
+            <a:extLst>
+              <a:ext uri="{96DAC541-7B7A-43D3-8B79-37D633B846F1}">
+                <asvg:svgBlip xmlns:asvg="http://schemas.microsoft.com/office/drawing/2016/SVG/main" r:embed="rId7"/>
+              </a:ext>
+            </a:extLst>
+          </a:blip>
+          <a:stretch>
+            <a:fillRect/>
+          </a:stretch>
+        </p:blipFill>
+        <p:spPr>
+          <a:xfrm rot="16200000">
+            <a:off x="1223333" y="3949999"/>
+            <a:ext cx="914400" cy="914400"/>
+          </a:xfrm>
+          <a:prstGeom prst="rect">
+            <a:avLst/>
+          </a:prstGeom>
+        </p:spPr>
+      </p:pic>
+      <p:cxnSp>
+        <p:nvCxnSpPr>
+          <p:cNvPr id="42" name="Straight Arrow Connector 41">
+            <a:extLst>
+              <a:ext uri="{FF2B5EF4-FFF2-40B4-BE49-F238E27FC236}">
+                <a16:creationId xmlns:a16="http://schemas.microsoft.com/office/drawing/2014/main" id="{B91607F9-96CF-7B21-E214-F5EA72D99C9B}"/>
+              </a:ext>
+            </a:extLst>
+          </p:cNvPr>
+          <p:cNvCxnSpPr/>
+          <p:nvPr/>
+        </p:nvCxnSpPr>
+        <p:spPr>
+          <a:xfrm>
+            <a:off x="2479964" y="4367227"/>
+            <a:ext cx="554182" cy="0"/>
+          </a:xfrm>
+          <a:prstGeom prst="straightConnector1">
+            <a:avLst/>
+          </a:prstGeom>
+          <a:ln>
+            <a:solidFill>
+              <a:schemeClr val="tx2">
+                <a:lumMod val="10000"/>
+                <a:lumOff val="90000"/>
+              </a:schemeClr>
+            </a:solidFill>
+            <a:headEnd type="triangle"/>
+            <a:tailEnd type="triangle"/>
+          </a:ln>
+        </p:spPr>
+        <p:style>
+          <a:lnRef idx="2">
+            <a:schemeClr val="accent1"/>
+          </a:lnRef>
+          <a:fillRef idx="0">
+            <a:schemeClr val="accent1"/>
+          </a:fillRef>
+          <a:effectRef idx="1">
+            <a:schemeClr val="accent1"/>
+          </a:effectRef>
+          <a:fontRef idx="minor">
+            <a:schemeClr val="tx1"/>
+          </a:fontRef>
+        </p:style>
+      </p:cxnSp>
+      <p:cxnSp>
+        <p:nvCxnSpPr>
+          <p:cNvPr id="43" name="Straight Arrow Connector 42">
+            <a:extLst>
+              <a:ext uri="{FF2B5EF4-FFF2-40B4-BE49-F238E27FC236}">
+                <a16:creationId xmlns:a16="http://schemas.microsoft.com/office/drawing/2014/main" id="{288D71DF-BB98-33B9-CFE8-58681ADEC4B0}"/>
+              </a:ext>
+            </a:extLst>
+          </p:cNvPr>
+          <p:cNvCxnSpPr>
+            <a:cxnSpLocks/>
+          </p:cNvCxnSpPr>
+          <p:nvPr/>
+        </p:nvCxnSpPr>
+        <p:spPr>
+          <a:xfrm>
+            <a:off x="2479964" y="1610172"/>
+            <a:ext cx="2355273" cy="0"/>
+          </a:xfrm>
+          <a:prstGeom prst="straightConnector1">
+            <a:avLst/>
+          </a:prstGeom>
+          <a:ln>
+            <a:solidFill>
+              <a:schemeClr val="tx2">
+                <a:lumMod val="10000"/>
+                <a:lumOff val="90000"/>
+              </a:schemeClr>
+            </a:solidFill>
+            <a:headEnd type="triangle"/>
+            <a:tailEnd type="triangle"/>
+          </a:ln>
+        </p:spPr>
+        <p:style>
+          <a:lnRef idx="2">
+            <a:schemeClr val="accent1"/>
+          </a:lnRef>
+          <a:fillRef idx="0">
+            <a:schemeClr val="accent1"/>
+          </a:fillRef>
+          <a:effectRef idx="1">
+            <a:schemeClr val="accent1"/>
+          </a:effectRef>
+          <a:fontRef idx="minor">
+            <a:schemeClr val="tx1"/>
+          </a:fontRef>
+        </p:style>
+      </p:cxnSp>
+      <p:cxnSp>
+        <p:nvCxnSpPr>
+          <p:cNvPr id="45" name="Straight Arrow Connector 44">
+            <a:extLst>
+              <a:ext uri="{FF2B5EF4-FFF2-40B4-BE49-F238E27FC236}">
+                <a16:creationId xmlns:a16="http://schemas.microsoft.com/office/drawing/2014/main" id="{6FFA2BE1-E153-F2A2-37D8-9057916BD8BA}"/>
+              </a:ext>
+            </a:extLst>
+          </p:cNvPr>
+          <p:cNvCxnSpPr/>
+          <p:nvPr/>
+        </p:nvCxnSpPr>
+        <p:spPr>
+          <a:xfrm>
+            <a:off x="4281055" y="4394937"/>
+            <a:ext cx="554182" cy="0"/>
+          </a:xfrm>
+          <a:prstGeom prst="straightConnector1">
+            <a:avLst/>
+          </a:prstGeom>
+          <a:ln>
+            <a:solidFill>
+              <a:schemeClr val="tx2">
+                <a:lumMod val="10000"/>
+                <a:lumOff val="90000"/>
+              </a:schemeClr>
+            </a:solidFill>
+            <a:headEnd type="triangle"/>
+            <a:tailEnd type="triangle"/>
+          </a:ln>
+        </p:spPr>
+        <p:style>
+          <a:lnRef idx="2">
+            <a:schemeClr val="accent1"/>
+          </a:lnRef>
+          <a:fillRef idx="0">
+            <a:schemeClr val="accent1"/>
+          </a:fillRef>
+          <a:effectRef idx="1">
+            <a:schemeClr val="accent1"/>
+          </a:effectRef>
+          <a:fontRef idx="minor">
+            <a:schemeClr val="tx1"/>
+          </a:fontRef>
+        </p:style>
+      </p:cxnSp>
+      <p:cxnSp>
+        <p:nvCxnSpPr>
+          <p:cNvPr id="46" name="Straight Arrow Connector 45">
+            <a:extLst>
+              <a:ext uri="{FF2B5EF4-FFF2-40B4-BE49-F238E27FC236}">
+                <a16:creationId xmlns:a16="http://schemas.microsoft.com/office/drawing/2014/main" id="{1B1E3879-FF5D-4DEA-887B-8B89D1F18399}"/>
+              </a:ext>
+            </a:extLst>
+          </p:cNvPr>
+          <p:cNvCxnSpPr/>
+          <p:nvPr/>
+        </p:nvCxnSpPr>
+        <p:spPr>
+          <a:xfrm>
+            <a:off x="5874327" y="3646791"/>
+            <a:ext cx="554182" cy="0"/>
+          </a:xfrm>
+          <a:prstGeom prst="straightConnector1">
+            <a:avLst/>
+          </a:prstGeom>
+          <a:ln>
+            <a:solidFill>
+              <a:schemeClr val="tx2">
+                <a:lumMod val="10000"/>
+                <a:lumOff val="90000"/>
+              </a:schemeClr>
+            </a:solidFill>
+            <a:headEnd type="triangle"/>
+            <a:tailEnd type="triangle"/>
+          </a:ln>
+        </p:spPr>
+        <p:style>
+          <a:lnRef idx="2">
+            <a:schemeClr val="accent1"/>
+          </a:lnRef>
+          <a:fillRef idx="0">
+            <a:schemeClr val="accent1"/>
+          </a:fillRef>
+          <a:effectRef idx="1">
+            <a:schemeClr val="accent1"/>
+          </a:effectRef>
+          <a:fontRef idx="minor">
+            <a:schemeClr val="tx1"/>
+          </a:fontRef>
+        </p:style>
+      </p:cxnSp>
+      <p:cxnSp>
+        <p:nvCxnSpPr>
+          <p:cNvPr id="47" name="Straight Arrow Connector 46">
+            <a:extLst>
+              <a:ext uri="{FF2B5EF4-FFF2-40B4-BE49-F238E27FC236}">
+                <a16:creationId xmlns:a16="http://schemas.microsoft.com/office/drawing/2014/main" id="{41BB7736-669F-46AC-F17F-F90A0F152698}"/>
+              </a:ext>
+            </a:extLst>
+          </p:cNvPr>
+          <p:cNvCxnSpPr/>
+          <p:nvPr/>
+        </p:nvCxnSpPr>
+        <p:spPr>
+          <a:xfrm>
+            <a:off x="5874327" y="2358318"/>
+            <a:ext cx="554182" cy="0"/>
+          </a:xfrm>
+          <a:prstGeom prst="straightConnector1">
+            <a:avLst/>
+          </a:prstGeom>
+          <a:ln>
+            <a:solidFill>
+              <a:schemeClr val="tx2">
+                <a:lumMod val="10000"/>
+                <a:lumOff val="90000"/>
+              </a:schemeClr>
+            </a:solidFill>
+            <a:headEnd type="triangle"/>
+            <a:tailEnd type="triangle"/>
+          </a:ln>
+        </p:spPr>
+        <p:style>
+          <a:lnRef idx="2">
+            <a:schemeClr val="accent1"/>
+          </a:lnRef>
+          <a:fillRef idx="0">
+            <a:schemeClr val="accent1"/>
+          </a:fillRef>
+          <a:effectRef idx="1">
+            <a:schemeClr val="accent1"/>
+          </a:effectRef>
+          <a:fontRef idx="minor">
+            <a:schemeClr val="tx1"/>
+          </a:fontRef>
+        </p:style>
+      </p:cxnSp>
+      <p:cxnSp>
+        <p:nvCxnSpPr>
+          <p:cNvPr id="48" name="Straight Arrow Connector 47">
+            <a:extLst>
+              <a:ext uri="{FF2B5EF4-FFF2-40B4-BE49-F238E27FC236}">
+                <a16:creationId xmlns:a16="http://schemas.microsoft.com/office/drawing/2014/main" id="{D6034F23-26D5-0F3C-516D-F0D6CB87B810}"/>
+              </a:ext>
+            </a:extLst>
+          </p:cNvPr>
+          <p:cNvCxnSpPr>
+            <a:cxnSpLocks/>
+          </p:cNvCxnSpPr>
+          <p:nvPr/>
+        </p:nvCxnSpPr>
+        <p:spPr>
+          <a:xfrm>
+            <a:off x="8520545" y="4325664"/>
+            <a:ext cx="1233056" cy="0"/>
+          </a:xfrm>
+          <a:prstGeom prst="straightConnector1">
+            <a:avLst/>
+          </a:prstGeom>
+          <a:ln>
+            <a:solidFill>
+              <a:schemeClr val="tx2">
+                <a:lumMod val="10000"/>
+                <a:lumOff val="90000"/>
+              </a:schemeClr>
+            </a:solidFill>
+            <a:headEnd type="triangle"/>
+            <a:tailEnd type="triangle"/>
+          </a:ln>
+        </p:spPr>
+        <p:style>
+          <a:lnRef idx="2">
+            <a:schemeClr val="accent1"/>
+          </a:lnRef>
+          <a:fillRef idx="0">
+            <a:schemeClr val="accent1"/>
+          </a:fillRef>
+          <a:effectRef idx="1">
+            <a:schemeClr val="accent1"/>
+          </a:effectRef>
+          <a:fontRef idx="minor">
+            <a:schemeClr val="tx1"/>
+          </a:fontRef>
+        </p:style>
+      </p:cxnSp>
+      <p:sp>
+        <p:nvSpPr>
+          <p:cNvPr id="51" name="TextBox 50">
+            <a:extLst>
+              <a:ext uri="{FF2B5EF4-FFF2-40B4-BE49-F238E27FC236}">
+                <a16:creationId xmlns:a16="http://schemas.microsoft.com/office/drawing/2014/main" id="{1A7D9758-DBD8-1C3C-C254-E03AF654CAD9}"/>
+              </a:ext>
+            </a:extLst>
+          </p:cNvPr>
+          <p:cNvSpPr txBox="1"/>
+          <p:nvPr/>
+        </p:nvSpPr>
+        <p:spPr>
+          <a:xfrm rot="16200000">
+            <a:off x="1734673" y="4008895"/>
+            <a:ext cx="1093541" cy="369332"/>
+          </a:xfrm>
+          <a:prstGeom prst="rect">
+            <a:avLst/>
+          </a:prstGeom>
+          <a:noFill/>
+        </p:spPr>
+        <p:txBody>
+          <a:bodyPr wrap="square">
+            <a:spAutoFit/>
+          </a:bodyPr>
+          <a:lstStyle/>
+          <a:p>
+            <a:r>
+              <a:rPr lang="en-US" dirty="0">
+                <a:solidFill>
+                  <a:schemeClr val="tx2">
+                    <a:lumMod val="25000"/>
+                    <a:lumOff val="75000"/>
+                  </a:schemeClr>
+                </a:solidFill>
+              </a:rPr>
+              <a:t>Users</a:t>
+            </a:r>
+            <a:endParaRPr lang="en-US" dirty="0"/>
+          </a:p>
+        </p:txBody>
+      </p:sp>
+      <p:sp>
+        <p:nvSpPr>
+          <p:cNvPr id="52" name="TextBox 51">
+            <a:extLst>
+              <a:ext uri="{FF2B5EF4-FFF2-40B4-BE49-F238E27FC236}">
+                <a16:creationId xmlns:a16="http://schemas.microsoft.com/office/drawing/2014/main" id="{99E0157B-2DF5-DD52-90DE-A229798E18B8}"/>
+              </a:ext>
+            </a:extLst>
+          </p:cNvPr>
+          <p:cNvSpPr txBox="1"/>
+          <p:nvPr/>
+        </p:nvSpPr>
+        <p:spPr>
+          <a:xfrm rot="16200000">
+            <a:off x="1800043" y="1293266"/>
+            <a:ext cx="1093541" cy="369332"/>
+          </a:xfrm>
+          <a:prstGeom prst="rect">
+            <a:avLst/>
+          </a:prstGeom>
+          <a:noFill/>
+        </p:spPr>
+        <p:txBody>
+          <a:bodyPr wrap="square">
+            <a:spAutoFit/>
+          </a:bodyPr>
+          <a:lstStyle/>
+          <a:p>
+            <a:r>
+              <a:rPr lang="en-US" dirty="0">
+                <a:solidFill>
+                  <a:schemeClr val="tx2">
+                    <a:lumMod val="25000"/>
+                    <a:lumOff val="75000"/>
+                  </a:schemeClr>
+                </a:solidFill>
+              </a:rPr>
+              <a:t>Systems</a:t>
+            </a:r>
+            <a:endParaRPr lang="en-US" dirty="0"/>
+          </a:p>
+        </p:txBody>
+      </p:sp>
+    </p:spTree>
+    <p:extLst>
+      <p:ext uri="{BB962C8B-B14F-4D97-AF65-F5344CB8AC3E}">
+        <p14:creationId xmlns:p14="http://schemas.microsoft.com/office/powerpoint/2010/main" val="2184043765"/>
       </p:ext>
     </p:extLst>
   </p:cSld>

</xml_diff>

<commit_message>
Deployed 77bd64f with MkDocs version: 1.6.1
</commit_message>
<xml_diff>
--- a/assets/illustrations.pptx
+++ b/assets/illustrations.pptx
@@ -8,6 +8,10 @@
     <p:sldId id="256" r:id="rId2"/>
     <p:sldId id="257" r:id="rId3"/>
     <p:sldId id="258" r:id="rId4"/>
+    <p:sldId id="260" r:id="rId5"/>
+    <p:sldId id="259" r:id="rId6"/>
+    <p:sldId id="262" r:id="rId7"/>
+    <p:sldId id="263" r:id="rId8"/>
   </p:sldIdLst>
   <p:sldSz cx="12192000" cy="6858000"/>
   <p:notesSz cx="6858000" cy="9144000"/>
@@ -261,7 +265,7 @@
           <a:p>
             <a:fld id="{B6EBD849-BF62-3E41-9392-B52349D77D8A}" type="datetimeFigureOut">
               <a:rPr lang="en-US" smtClean="0"/>
-              <a:t>1/21/26</a:t>
+              <a:t>1/23/26</a:t>
             </a:fld>
             <a:endParaRPr lang="en-US"/>
           </a:p>
@@ -459,7 +463,7 @@
           <a:p>
             <a:fld id="{B6EBD849-BF62-3E41-9392-B52349D77D8A}" type="datetimeFigureOut">
               <a:rPr lang="en-US" smtClean="0"/>
-              <a:t>1/21/26</a:t>
+              <a:t>1/23/26</a:t>
             </a:fld>
             <a:endParaRPr lang="en-US"/>
           </a:p>
@@ -667,7 +671,7 @@
           <a:p>
             <a:fld id="{B6EBD849-BF62-3E41-9392-B52349D77D8A}" type="datetimeFigureOut">
               <a:rPr lang="en-US" smtClean="0"/>
-              <a:t>1/21/26</a:t>
+              <a:t>1/23/26</a:t>
             </a:fld>
             <a:endParaRPr lang="en-US"/>
           </a:p>
@@ -865,7 +869,7 @@
           <a:p>
             <a:fld id="{B6EBD849-BF62-3E41-9392-B52349D77D8A}" type="datetimeFigureOut">
               <a:rPr lang="en-US" smtClean="0"/>
-              <a:t>1/21/26</a:t>
+              <a:t>1/23/26</a:t>
             </a:fld>
             <a:endParaRPr lang="en-US"/>
           </a:p>
@@ -1140,7 +1144,7 @@
           <a:p>
             <a:fld id="{B6EBD849-BF62-3E41-9392-B52349D77D8A}" type="datetimeFigureOut">
               <a:rPr lang="en-US" smtClean="0"/>
-              <a:t>1/21/26</a:t>
+              <a:t>1/23/26</a:t>
             </a:fld>
             <a:endParaRPr lang="en-US"/>
           </a:p>
@@ -1405,7 +1409,7 @@
           <a:p>
             <a:fld id="{B6EBD849-BF62-3E41-9392-B52349D77D8A}" type="datetimeFigureOut">
               <a:rPr lang="en-US" smtClean="0"/>
-              <a:t>1/21/26</a:t>
+              <a:t>1/23/26</a:t>
             </a:fld>
             <a:endParaRPr lang="en-US"/>
           </a:p>
@@ -1817,7 +1821,7 @@
           <a:p>
             <a:fld id="{B6EBD849-BF62-3E41-9392-B52349D77D8A}" type="datetimeFigureOut">
               <a:rPr lang="en-US" smtClean="0"/>
-              <a:t>1/21/26</a:t>
+              <a:t>1/23/26</a:t>
             </a:fld>
             <a:endParaRPr lang="en-US"/>
           </a:p>
@@ -1958,7 +1962,7 @@
           <a:p>
             <a:fld id="{B6EBD849-BF62-3E41-9392-B52349D77D8A}" type="datetimeFigureOut">
               <a:rPr lang="en-US" smtClean="0"/>
-              <a:t>1/21/26</a:t>
+              <a:t>1/23/26</a:t>
             </a:fld>
             <a:endParaRPr lang="en-US"/>
           </a:p>
@@ -2071,7 +2075,7 @@
           <a:p>
             <a:fld id="{B6EBD849-BF62-3E41-9392-B52349D77D8A}" type="datetimeFigureOut">
               <a:rPr lang="en-US" smtClean="0"/>
-              <a:t>1/21/26</a:t>
+              <a:t>1/23/26</a:t>
             </a:fld>
             <a:endParaRPr lang="en-US"/>
           </a:p>
@@ -2382,7 +2386,7 @@
           <a:p>
             <a:fld id="{B6EBD849-BF62-3E41-9392-B52349D77D8A}" type="datetimeFigureOut">
               <a:rPr lang="en-US" smtClean="0"/>
-              <a:t>1/21/26</a:t>
+              <a:t>1/23/26</a:t>
             </a:fld>
             <a:endParaRPr lang="en-US"/>
           </a:p>
@@ -2670,7 +2674,7 @@
           <a:p>
             <a:fld id="{B6EBD849-BF62-3E41-9392-B52349D77D8A}" type="datetimeFigureOut">
               <a:rPr lang="en-US" smtClean="0"/>
-              <a:t>1/21/26</a:t>
+              <a:t>1/23/26</a:t>
             </a:fld>
             <a:endParaRPr lang="en-US"/>
           </a:p>
@@ -2911,7 +2915,7 @@
           <a:p>
             <a:fld id="{B6EBD849-BF62-3E41-9392-B52349D77D8A}" type="datetimeFigureOut">
               <a:rPr lang="en-US" smtClean="0"/>
-              <a:t>1/21/26</a:t>
+              <a:t>1/23/26</a:t>
             </a:fld>
             <a:endParaRPr lang="en-US"/>
           </a:p>
@@ -3945,8 +3949,8 @@
         </p:nvSpPr>
         <p:spPr>
           <a:xfrm>
-            <a:off x="10284679" y="2598486"/>
-            <a:ext cx="1248416" cy="646331"/>
+            <a:off x="10284678" y="2598486"/>
+            <a:ext cx="1666239" cy="646331"/>
           </a:xfrm>
           <a:prstGeom prst="rect">
             <a:avLst/>
@@ -3967,7 +3971,7 @@
                 </a:solidFill>
                 <a:latin typeface="Avenir Book" panose="02000503020000020003" pitchFamily="2" charset="0"/>
               </a:rPr>
-              <a:t>Your Agents</a:t>
+              <a:t>Your/Partner Agents</a:t>
             </a:r>
           </a:p>
         </p:txBody>
@@ -4148,6 +4152,104 @@
           </a:p>
         </p:txBody>
       </p:sp>
+      <p:cxnSp>
+        <p:nvCxnSpPr>
+          <p:cNvPr id="3" name="Elbow Connector 2">
+            <a:extLst>
+              <a:ext uri="{FF2B5EF4-FFF2-40B4-BE49-F238E27FC236}">
+                <a16:creationId xmlns:a16="http://schemas.microsoft.com/office/drawing/2014/main" id="{B5074EB8-0491-742A-5320-4925E4B4F95C}"/>
+              </a:ext>
+            </a:extLst>
+          </p:cNvPr>
+          <p:cNvCxnSpPr>
+            <a:cxnSpLocks/>
+          </p:cNvCxnSpPr>
+          <p:nvPr/>
+        </p:nvCxnSpPr>
+        <p:spPr>
+          <a:xfrm rot="10800000" flipV="1">
+            <a:off x="8801223" y="3378355"/>
+            <a:ext cx="2107664" cy="2080470"/>
+          </a:xfrm>
+          <a:prstGeom prst="bentConnector3">
+            <a:avLst>
+              <a:gd name="adj1" fmla="val 57"/>
+            </a:avLst>
+          </a:prstGeom>
+          <a:ln>
+            <a:solidFill>
+              <a:schemeClr val="bg1">
+                <a:lumMod val="85000"/>
+              </a:schemeClr>
+            </a:solidFill>
+            <a:headEnd type="triangle"/>
+            <a:tailEnd type="triangle"/>
+          </a:ln>
+        </p:spPr>
+        <p:style>
+          <a:lnRef idx="2">
+            <a:schemeClr val="accent1"/>
+          </a:lnRef>
+          <a:fillRef idx="0">
+            <a:schemeClr val="accent1"/>
+          </a:fillRef>
+          <a:effectRef idx="1">
+            <a:schemeClr val="accent1"/>
+          </a:effectRef>
+          <a:fontRef idx="minor">
+            <a:schemeClr val="tx1"/>
+          </a:fontRef>
+        </p:style>
+      </p:cxnSp>
+      <p:cxnSp>
+        <p:nvCxnSpPr>
+          <p:cNvPr id="18" name="Elbow Connector 17">
+            <a:extLst>
+              <a:ext uri="{FF2B5EF4-FFF2-40B4-BE49-F238E27FC236}">
+                <a16:creationId xmlns:a16="http://schemas.microsoft.com/office/drawing/2014/main" id="{015C926B-A91A-DC11-2039-ED3E15929550}"/>
+              </a:ext>
+            </a:extLst>
+          </p:cNvPr>
+          <p:cNvCxnSpPr>
+            <a:cxnSpLocks/>
+          </p:cNvCxnSpPr>
+          <p:nvPr/>
+        </p:nvCxnSpPr>
+        <p:spPr>
+          <a:xfrm rot="10800000" flipV="1">
+            <a:off x="9086976" y="3444777"/>
+            <a:ext cx="1520298" cy="907043"/>
+          </a:xfrm>
+          <a:prstGeom prst="bentConnector3">
+            <a:avLst>
+              <a:gd name="adj1" fmla="val -355"/>
+            </a:avLst>
+          </a:prstGeom>
+          <a:ln>
+            <a:solidFill>
+              <a:schemeClr val="bg1">
+                <a:lumMod val="85000"/>
+              </a:schemeClr>
+            </a:solidFill>
+            <a:headEnd type="triangle"/>
+            <a:tailEnd type="triangle"/>
+          </a:ln>
+        </p:spPr>
+        <p:style>
+          <a:lnRef idx="2">
+            <a:schemeClr val="accent1"/>
+          </a:lnRef>
+          <a:fillRef idx="0">
+            <a:schemeClr val="accent1"/>
+          </a:fillRef>
+          <a:effectRef idx="1">
+            <a:schemeClr val="accent1"/>
+          </a:effectRef>
+          <a:fontRef idx="minor">
+            <a:schemeClr val="tx1"/>
+          </a:fontRef>
+        </p:style>
+      </p:cxnSp>
     </p:spTree>
     <p:extLst>
       <p:ext uri="{BB962C8B-B14F-4D97-AF65-F5344CB8AC3E}">
@@ -5586,7 +5688,7 @@
                   </a:schemeClr>
                 </a:solidFill>
               </a:rPr>
-              <a:t>Agent-Human Collaboration UI</a:t>
+              <a:t>Agent  -  Human UI</a:t>
             </a:r>
           </a:p>
         </p:txBody>
@@ -5651,7 +5753,7 @@
                   </a:schemeClr>
                 </a:solidFill>
               </a:rPr>
-              <a:t>Agent Control Plane (ACP) – E.g., Xians</a:t>
+              <a:t>Agent Control Plane  (ACP) </a:t>
             </a:r>
           </a:p>
         </p:txBody>
@@ -6329,6 +6431,3330 @@
     <p:extLst>
       <p:ext uri="{BB962C8B-B14F-4D97-AF65-F5344CB8AC3E}">
         <p14:creationId xmlns:p14="http://schemas.microsoft.com/office/powerpoint/2010/main" val="2184043765"/>
+      </p:ext>
+    </p:extLst>
+  </p:cSld>
+  <p:clrMapOvr>
+    <a:masterClrMapping/>
+  </p:clrMapOvr>
+</p:sld>
+</file>
+
+<file path=ppt/slides/slide4.xml><?xml version="1.0" encoding="utf-8"?>
+<p:sld xmlns:a="http://schemas.openxmlformats.org/drawingml/2006/main" xmlns:r="http://schemas.openxmlformats.org/officeDocument/2006/relationships" xmlns:p="http://schemas.openxmlformats.org/presentationml/2006/main">
+  <p:cSld>
+    <p:spTree>
+      <p:nvGrpSpPr>
+        <p:cNvPr id="1" name=""/>
+        <p:cNvGrpSpPr/>
+        <p:nvPr/>
+      </p:nvGrpSpPr>
+      <p:grpSpPr>
+        <a:xfrm>
+          <a:off x="0" y="0"/>
+          <a:ext cx="0" cy="0"/>
+          <a:chOff x="0" y="0"/>
+          <a:chExt cx="0" cy="0"/>
+        </a:xfrm>
+      </p:grpSpPr>
+      <p:sp>
+        <p:nvSpPr>
+          <p:cNvPr id="2" name="Title 1">
+            <a:extLst>
+              <a:ext uri="{FF2B5EF4-FFF2-40B4-BE49-F238E27FC236}">
+                <a16:creationId xmlns:a16="http://schemas.microsoft.com/office/drawing/2014/main" id="{6BC84D04-C73A-E890-119E-690D52C94234}"/>
+              </a:ext>
+            </a:extLst>
+          </p:cNvPr>
+          <p:cNvSpPr>
+            <a:spLocks noGrp="1"/>
+          </p:cNvSpPr>
+          <p:nvPr>
+            <p:ph type="title"/>
+          </p:nvPr>
+        </p:nvSpPr>
+        <p:spPr>
+          <a:xfrm>
+            <a:off x="838200" y="2766218"/>
+            <a:ext cx="10515600" cy="1325563"/>
+          </a:xfrm>
+        </p:spPr>
+        <p:txBody>
+          <a:bodyPr/>
+          <a:lstStyle/>
+          <a:p>
+            <a:r>
+              <a:rPr lang="en-US" dirty="0"/>
+              <a:t>Gture platform</a:t>
+            </a:r>
+          </a:p>
+        </p:txBody>
+      </p:sp>
+    </p:spTree>
+    <p:extLst>
+      <p:ext uri="{BB962C8B-B14F-4D97-AF65-F5344CB8AC3E}">
+        <p14:creationId xmlns:p14="http://schemas.microsoft.com/office/powerpoint/2010/main" val="3353922584"/>
+      </p:ext>
+    </p:extLst>
+  </p:cSld>
+  <p:clrMapOvr>
+    <a:masterClrMapping/>
+  </p:clrMapOvr>
+</p:sld>
+</file>
+
+<file path=ppt/slides/slide5.xml><?xml version="1.0" encoding="utf-8"?>
+<p:sld xmlns:a="http://schemas.openxmlformats.org/drawingml/2006/main" xmlns:r="http://schemas.openxmlformats.org/officeDocument/2006/relationships" xmlns:p="http://schemas.openxmlformats.org/presentationml/2006/main">
+  <p:cSld>
+    <p:bg>
+      <p:bgPr>
+        <a:solidFill>
+          <a:schemeClr val="tx1">
+            <a:lumMod val="85000"/>
+            <a:lumOff val="15000"/>
+          </a:schemeClr>
+        </a:solidFill>
+        <a:effectLst/>
+      </p:bgPr>
+    </p:bg>
+    <p:spTree>
+      <p:nvGrpSpPr>
+        <p:cNvPr id="1" name="">
+          <a:extLst>
+            <a:ext uri="{FF2B5EF4-FFF2-40B4-BE49-F238E27FC236}">
+              <a16:creationId xmlns:a16="http://schemas.microsoft.com/office/drawing/2014/main" id="{84D52D84-3C61-5BF2-EC63-D296DE7DAF2D}"/>
+            </a:ext>
+          </a:extLst>
+        </p:cNvPr>
+        <p:cNvGrpSpPr/>
+        <p:nvPr/>
+      </p:nvGrpSpPr>
+      <p:grpSpPr>
+        <a:xfrm>
+          <a:off x="0" y="0"/>
+          <a:ext cx="0" cy="0"/>
+          <a:chOff x="0" y="0"/>
+          <a:chExt cx="0" cy="0"/>
+        </a:xfrm>
+      </p:grpSpPr>
+      <p:pic>
+        <p:nvPicPr>
+          <p:cNvPr id="12" name="Graphic 11" descr="Server with solid fill">
+            <a:extLst>
+              <a:ext uri="{FF2B5EF4-FFF2-40B4-BE49-F238E27FC236}">
+                <a16:creationId xmlns:a16="http://schemas.microsoft.com/office/drawing/2014/main" id="{1AE68B3B-5B02-9FEB-4233-2283C123109B}"/>
+              </a:ext>
+            </a:extLst>
+          </p:cNvPr>
+          <p:cNvPicPr>
+            <a:picLocks noChangeAspect="1"/>
+          </p:cNvPicPr>
+          <p:nvPr/>
+        </p:nvPicPr>
+        <p:blipFill>
+          <a:blip r:embed="rId2">
+            <a:extLst>
+              <a:ext uri="{96DAC541-7B7A-43D3-8B79-37D633B846F1}">
+                <asvg:svgBlip xmlns:asvg="http://schemas.microsoft.com/office/drawing/2016/SVG/main" r:embed="rId3"/>
+              </a:ext>
+            </a:extLst>
+          </a:blip>
+          <a:stretch>
+            <a:fillRect/>
+          </a:stretch>
+        </p:blipFill>
+        <p:spPr>
+          <a:xfrm>
+            <a:off x="7664393" y="3233071"/>
+            <a:ext cx="926974" cy="926974"/>
+          </a:xfrm>
+          <a:prstGeom prst="rect">
+            <a:avLst/>
+          </a:prstGeom>
+        </p:spPr>
+      </p:pic>
+      <p:sp>
+        <p:nvSpPr>
+          <p:cNvPr id="15" name="TextBox 14">
+            <a:extLst>
+              <a:ext uri="{FF2B5EF4-FFF2-40B4-BE49-F238E27FC236}">
+                <a16:creationId xmlns:a16="http://schemas.microsoft.com/office/drawing/2014/main" id="{EE7EA5B7-A6E6-DBB4-F907-FE864A2F7DE8}"/>
+              </a:ext>
+            </a:extLst>
+          </p:cNvPr>
+          <p:cNvSpPr txBox="1"/>
+          <p:nvPr/>
+        </p:nvSpPr>
+        <p:spPr>
+          <a:xfrm>
+            <a:off x="7276915" y="4140195"/>
+            <a:ext cx="1757193" cy="646331"/>
+          </a:xfrm>
+          <a:prstGeom prst="rect">
+            <a:avLst/>
+          </a:prstGeom>
+          <a:noFill/>
+        </p:spPr>
+        <p:txBody>
+          <a:bodyPr wrap="square" rtlCol="0">
+            <a:spAutoFit/>
+          </a:bodyPr>
+          <a:lstStyle/>
+          <a:p>
+            <a:pPr algn="ctr"/>
+            <a:r>
+              <a:rPr lang="en-US" dirty="0">
+                <a:solidFill>
+                  <a:schemeClr val="tx2">
+                    <a:lumMod val="25000"/>
+                    <a:lumOff val="75000"/>
+                  </a:schemeClr>
+                </a:solidFill>
+                <a:latin typeface="Avenir Book" panose="02000503020000020003" pitchFamily="2" charset="0"/>
+              </a:rPr>
+              <a:t>Gture platform server</a:t>
+            </a:r>
+          </a:p>
+        </p:txBody>
+      </p:sp>
+      <p:cxnSp>
+        <p:nvCxnSpPr>
+          <p:cNvPr id="22" name="Straight Arrow Connector 21">
+            <a:extLst>
+              <a:ext uri="{FF2B5EF4-FFF2-40B4-BE49-F238E27FC236}">
+                <a16:creationId xmlns:a16="http://schemas.microsoft.com/office/drawing/2014/main" id="{08C11838-834A-4E69-F87E-909C42DA98F7}"/>
+              </a:ext>
+            </a:extLst>
+          </p:cNvPr>
+          <p:cNvCxnSpPr>
+            <a:cxnSpLocks/>
+          </p:cNvCxnSpPr>
+          <p:nvPr/>
+        </p:nvCxnSpPr>
+        <p:spPr>
+          <a:xfrm>
+            <a:off x="9186530" y="3846679"/>
+            <a:ext cx="691117" cy="0"/>
+          </a:xfrm>
+          <a:prstGeom prst="straightConnector1">
+            <a:avLst/>
+          </a:prstGeom>
+          <a:ln>
+            <a:solidFill>
+              <a:schemeClr val="bg1"/>
+            </a:solidFill>
+            <a:headEnd type="triangle"/>
+            <a:tailEnd type="triangle"/>
+          </a:ln>
+        </p:spPr>
+        <p:style>
+          <a:lnRef idx="2">
+            <a:schemeClr val="accent1"/>
+          </a:lnRef>
+          <a:fillRef idx="0">
+            <a:schemeClr val="accent1"/>
+          </a:fillRef>
+          <a:effectRef idx="1">
+            <a:schemeClr val="accent1"/>
+          </a:effectRef>
+          <a:fontRef idx="minor">
+            <a:schemeClr val="tx1"/>
+          </a:fontRef>
+        </p:style>
+      </p:cxnSp>
+      <p:pic>
+        <p:nvPicPr>
+          <p:cNvPr id="24" name="Graphic 23" descr="Artificial Intelligence with solid fill">
+            <a:extLst>
+              <a:ext uri="{FF2B5EF4-FFF2-40B4-BE49-F238E27FC236}">
+                <a16:creationId xmlns:a16="http://schemas.microsoft.com/office/drawing/2014/main" id="{010FF37F-EDC4-F1DC-A3D9-E9C4017860B0}"/>
+              </a:ext>
+            </a:extLst>
+          </p:cNvPr>
+          <p:cNvPicPr>
+            <a:picLocks noChangeAspect="1"/>
+          </p:cNvPicPr>
+          <p:nvPr/>
+        </p:nvPicPr>
+        <p:blipFill>
+          <a:blip r:embed="rId4">
+            <a:extLst>
+              <a:ext uri="{96DAC541-7B7A-43D3-8B79-37D633B846F1}">
+                <asvg:svgBlip xmlns:asvg="http://schemas.microsoft.com/office/drawing/2016/SVG/main" r:embed="rId5"/>
+              </a:ext>
+            </a:extLst>
+          </a:blip>
+          <a:stretch>
+            <a:fillRect/>
+          </a:stretch>
+        </p:blipFill>
+        <p:spPr>
+          <a:xfrm>
+            <a:off x="10635715" y="3371570"/>
+            <a:ext cx="549643" cy="549643"/>
+          </a:xfrm>
+          <a:prstGeom prst="rect">
+            <a:avLst/>
+          </a:prstGeom>
+        </p:spPr>
+      </p:pic>
+      <p:pic>
+        <p:nvPicPr>
+          <p:cNvPr id="25" name="Graphic 24" descr="Artificial Intelligence with solid fill">
+            <a:extLst>
+              <a:ext uri="{FF2B5EF4-FFF2-40B4-BE49-F238E27FC236}">
+                <a16:creationId xmlns:a16="http://schemas.microsoft.com/office/drawing/2014/main" id="{F7A9243E-3412-CEAE-3475-FEBAF287DA74}"/>
+              </a:ext>
+            </a:extLst>
+          </p:cNvPr>
+          <p:cNvPicPr>
+            <a:picLocks noChangeAspect="1"/>
+          </p:cNvPicPr>
+          <p:nvPr/>
+        </p:nvPicPr>
+        <p:blipFill>
+          <a:blip r:embed="rId4">
+            <a:extLst>
+              <a:ext uri="{96DAC541-7B7A-43D3-8B79-37D633B846F1}">
+                <asvg:svgBlip xmlns:asvg="http://schemas.microsoft.com/office/drawing/2016/SVG/main" r:embed="rId5"/>
+              </a:ext>
+            </a:extLst>
+          </a:blip>
+          <a:stretch>
+            <a:fillRect/>
+          </a:stretch>
+        </p:blipFill>
+        <p:spPr>
+          <a:xfrm>
+            <a:off x="10788115" y="3523970"/>
+            <a:ext cx="549643" cy="549643"/>
+          </a:xfrm>
+          <a:prstGeom prst="rect">
+            <a:avLst/>
+          </a:prstGeom>
+        </p:spPr>
+      </p:pic>
+      <p:sp>
+        <p:nvSpPr>
+          <p:cNvPr id="26" name="TextBox 25">
+            <a:extLst>
+              <a:ext uri="{FF2B5EF4-FFF2-40B4-BE49-F238E27FC236}">
+                <a16:creationId xmlns:a16="http://schemas.microsoft.com/office/drawing/2014/main" id="{CB762A28-4C61-EAF9-799F-5D679C05A716}"/>
+              </a:ext>
+            </a:extLst>
+          </p:cNvPr>
+          <p:cNvSpPr txBox="1"/>
+          <p:nvPr/>
+        </p:nvSpPr>
+        <p:spPr>
+          <a:xfrm>
+            <a:off x="10494219" y="4160045"/>
+            <a:ext cx="1248416" cy="461665"/>
+          </a:xfrm>
+          <a:prstGeom prst="rect">
+            <a:avLst/>
+          </a:prstGeom>
+          <a:noFill/>
+        </p:spPr>
+        <p:txBody>
+          <a:bodyPr wrap="square" rtlCol="0">
+            <a:spAutoFit/>
+          </a:bodyPr>
+          <a:lstStyle/>
+          <a:p>
+            <a:pPr algn="ctr"/>
+            <a:r>
+              <a:rPr lang="en-US" sz="1200" dirty="0">
+                <a:solidFill>
+                  <a:schemeClr val="bg1"/>
+                </a:solidFill>
+                <a:latin typeface="Avenir Book" panose="02000503020000020003" pitchFamily="2" charset="0"/>
+              </a:rPr>
+              <a:t>Company A</a:t>
+            </a:r>
+          </a:p>
+          <a:p>
+            <a:pPr algn="ctr"/>
+            <a:r>
+              <a:rPr lang="en-US" sz="1200" dirty="0">
+                <a:solidFill>
+                  <a:schemeClr val="bg1"/>
+                </a:solidFill>
+                <a:latin typeface="Avenir Book" panose="02000503020000020003" pitchFamily="2" charset="0"/>
+              </a:rPr>
+              <a:t> AI Agents</a:t>
+            </a:r>
+          </a:p>
+        </p:txBody>
+      </p:sp>
+      <p:sp>
+        <p:nvSpPr>
+          <p:cNvPr id="7" name="Rounded Rectangle 6">
+            <a:extLst>
+              <a:ext uri="{FF2B5EF4-FFF2-40B4-BE49-F238E27FC236}">
+                <a16:creationId xmlns:a16="http://schemas.microsoft.com/office/drawing/2014/main" id="{5B4F8494-CECC-8A1C-3B95-EEBF4398F1A6}"/>
+              </a:ext>
+            </a:extLst>
+          </p:cNvPr>
+          <p:cNvSpPr/>
+          <p:nvPr/>
+        </p:nvSpPr>
+        <p:spPr>
+          <a:xfrm rot="5400000">
+            <a:off x="9478334" y="3625292"/>
+            <a:ext cx="1514417" cy="410995"/>
+          </a:xfrm>
+          <a:prstGeom prst="roundRect">
+            <a:avLst/>
+          </a:prstGeom>
+          <a:noFill/>
+          <a:ln>
+            <a:solidFill>
+              <a:schemeClr val="tx2">
+                <a:lumMod val="25000"/>
+                <a:lumOff val="75000"/>
+              </a:schemeClr>
+            </a:solidFill>
+          </a:ln>
+        </p:spPr>
+        <p:style>
+          <a:lnRef idx="2">
+            <a:schemeClr val="accent1">
+              <a:shade val="15000"/>
+            </a:schemeClr>
+          </a:lnRef>
+          <a:fillRef idx="1">
+            <a:schemeClr val="accent1"/>
+          </a:fillRef>
+          <a:effectRef idx="0">
+            <a:schemeClr val="accent1"/>
+          </a:effectRef>
+          <a:fontRef idx="minor">
+            <a:schemeClr val="lt1"/>
+          </a:fontRef>
+        </p:style>
+        <p:txBody>
+          <a:bodyPr rtlCol="0" anchor="ctr"/>
+          <a:lstStyle/>
+          <a:p>
+            <a:pPr algn="ctr"/>
+            <a:r>
+              <a:rPr lang="en-US" dirty="0">
+                <a:solidFill>
+                  <a:schemeClr val="tx2">
+                    <a:lumMod val="25000"/>
+                    <a:lumOff val="75000"/>
+                  </a:schemeClr>
+                </a:solidFill>
+              </a:rPr>
+              <a:t>Lib </a:t>
+            </a:r>
+          </a:p>
+        </p:txBody>
+      </p:sp>
+      <p:sp>
+        <p:nvSpPr>
+          <p:cNvPr id="9" name="Rounded Rectangle 8">
+            <a:extLst>
+              <a:ext uri="{FF2B5EF4-FFF2-40B4-BE49-F238E27FC236}">
+                <a16:creationId xmlns:a16="http://schemas.microsoft.com/office/drawing/2014/main" id="{F75E1856-4911-7970-D783-ACE1A4098EB0}"/>
+              </a:ext>
+            </a:extLst>
+          </p:cNvPr>
+          <p:cNvSpPr/>
+          <p:nvPr/>
+        </p:nvSpPr>
+        <p:spPr>
+          <a:xfrm>
+            <a:off x="7455747" y="1791026"/>
+            <a:ext cx="1380618" cy="662275"/>
+          </a:xfrm>
+          <a:prstGeom prst="roundRect">
+            <a:avLst/>
+          </a:prstGeom>
+          <a:noFill/>
+          <a:ln>
+            <a:solidFill>
+              <a:schemeClr val="tx2">
+                <a:lumMod val="25000"/>
+                <a:lumOff val="75000"/>
+              </a:schemeClr>
+            </a:solidFill>
+          </a:ln>
+        </p:spPr>
+        <p:style>
+          <a:lnRef idx="2">
+            <a:schemeClr val="accent1">
+              <a:shade val="15000"/>
+            </a:schemeClr>
+          </a:lnRef>
+          <a:fillRef idx="1">
+            <a:schemeClr val="accent1"/>
+          </a:fillRef>
+          <a:effectRef idx="0">
+            <a:schemeClr val="accent1"/>
+          </a:effectRef>
+          <a:fontRef idx="minor">
+            <a:schemeClr val="lt1"/>
+          </a:fontRef>
+        </p:style>
+        <p:txBody>
+          <a:bodyPr rtlCol="0" anchor="ctr"/>
+          <a:lstStyle/>
+          <a:p>
+            <a:pPr algn="ctr"/>
+            <a:r>
+              <a:rPr lang="en-US" dirty="0">
+                <a:solidFill>
+                  <a:schemeClr val="tx2">
+                    <a:lumMod val="25000"/>
+                    <a:lumOff val="75000"/>
+                  </a:schemeClr>
+                </a:solidFill>
+              </a:rPr>
+              <a:t>Gture Dev Portal</a:t>
+            </a:r>
+          </a:p>
+        </p:txBody>
+      </p:sp>
+      <p:cxnSp>
+        <p:nvCxnSpPr>
+          <p:cNvPr id="11" name="Straight Arrow Connector 10">
+            <a:extLst>
+              <a:ext uri="{FF2B5EF4-FFF2-40B4-BE49-F238E27FC236}">
+                <a16:creationId xmlns:a16="http://schemas.microsoft.com/office/drawing/2014/main" id="{00A5793B-D2FF-4EF3-6822-3A596FD6AF0B}"/>
+              </a:ext>
+            </a:extLst>
+          </p:cNvPr>
+          <p:cNvCxnSpPr>
+            <a:cxnSpLocks/>
+          </p:cNvCxnSpPr>
+          <p:nvPr/>
+        </p:nvCxnSpPr>
+        <p:spPr>
+          <a:xfrm>
+            <a:off x="8142838" y="2536875"/>
+            <a:ext cx="0" cy="483541"/>
+          </a:xfrm>
+          <a:prstGeom prst="straightConnector1">
+            <a:avLst/>
+          </a:prstGeom>
+          <a:ln>
+            <a:solidFill>
+              <a:schemeClr val="tx2">
+                <a:lumMod val="25000"/>
+                <a:lumOff val="75000"/>
+              </a:schemeClr>
+            </a:solidFill>
+            <a:headEnd type="triangle"/>
+            <a:tailEnd type="triangle"/>
+          </a:ln>
+        </p:spPr>
+        <p:style>
+          <a:lnRef idx="2">
+            <a:schemeClr val="accent1"/>
+          </a:lnRef>
+          <a:fillRef idx="0">
+            <a:schemeClr val="accent1"/>
+          </a:fillRef>
+          <a:effectRef idx="1">
+            <a:schemeClr val="accent1"/>
+          </a:effectRef>
+          <a:fontRef idx="minor">
+            <a:schemeClr val="tx1"/>
+          </a:fontRef>
+        </p:style>
+      </p:cxnSp>
+      <p:sp>
+        <p:nvSpPr>
+          <p:cNvPr id="29" name="Rounded Rectangle 28">
+            <a:extLst>
+              <a:ext uri="{FF2B5EF4-FFF2-40B4-BE49-F238E27FC236}">
+                <a16:creationId xmlns:a16="http://schemas.microsoft.com/office/drawing/2014/main" id="{0800A040-7552-BFBE-BE34-11CC8A92422A}"/>
+              </a:ext>
+            </a:extLst>
+          </p:cNvPr>
+          <p:cNvSpPr/>
+          <p:nvPr/>
+        </p:nvSpPr>
+        <p:spPr>
+          <a:xfrm>
+            <a:off x="7276915" y="3108196"/>
+            <a:ext cx="1757193" cy="3250559"/>
+          </a:xfrm>
+          <a:prstGeom prst="roundRect">
+            <a:avLst>
+              <a:gd name="adj" fmla="val 6608"/>
+            </a:avLst>
+          </a:prstGeom>
+          <a:noFill/>
+          <a:ln>
+            <a:solidFill>
+              <a:schemeClr val="tx2">
+                <a:lumMod val="25000"/>
+                <a:lumOff val="75000"/>
+              </a:schemeClr>
+            </a:solidFill>
+          </a:ln>
+        </p:spPr>
+        <p:style>
+          <a:lnRef idx="2">
+            <a:schemeClr val="accent1">
+              <a:shade val="15000"/>
+            </a:schemeClr>
+          </a:lnRef>
+          <a:fillRef idx="1">
+            <a:schemeClr val="accent1"/>
+          </a:fillRef>
+          <a:effectRef idx="0">
+            <a:schemeClr val="accent1"/>
+          </a:effectRef>
+          <a:fontRef idx="minor">
+            <a:schemeClr val="lt1"/>
+          </a:fontRef>
+        </p:style>
+        <p:txBody>
+          <a:bodyPr rtlCol="0" anchor="ctr"/>
+          <a:lstStyle/>
+          <a:p>
+            <a:pPr algn="ctr"/>
+            <a:endParaRPr lang="en-US" dirty="0">
+              <a:solidFill>
+                <a:schemeClr val="tx2">
+                  <a:lumMod val="25000"/>
+                  <a:lumOff val="75000"/>
+                </a:schemeClr>
+              </a:solidFill>
+            </a:endParaRPr>
+          </a:p>
+        </p:txBody>
+      </p:sp>
+      <p:sp>
+        <p:nvSpPr>
+          <p:cNvPr id="2" name="Rounded Rectangle 1">
+            <a:extLst>
+              <a:ext uri="{FF2B5EF4-FFF2-40B4-BE49-F238E27FC236}">
+                <a16:creationId xmlns:a16="http://schemas.microsoft.com/office/drawing/2014/main" id="{E9D118BF-0B95-CEBE-8681-6F2E8FAA31C1}"/>
+              </a:ext>
+            </a:extLst>
+          </p:cNvPr>
+          <p:cNvSpPr/>
+          <p:nvPr/>
+        </p:nvSpPr>
+        <p:spPr>
+          <a:xfrm>
+            <a:off x="527440" y="1791025"/>
+            <a:ext cx="1586753" cy="662275"/>
+          </a:xfrm>
+          <a:prstGeom prst="roundRect">
+            <a:avLst/>
+          </a:prstGeom>
+          <a:noFill/>
+          <a:ln>
+            <a:solidFill>
+              <a:schemeClr val="tx2">
+                <a:lumMod val="25000"/>
+                <a:lumOff val="75000"/>
+              </a:schemeClr>
+            </a:solidFill>
+          </a:ln>
+        </p:spPr>
+        <p:style>
+          <a:lnRef idx="2">
+            <a:schemeClr val="accent1">
+              <a:shade val="15000"/>
+            </a:schemeClr>
+          </a:lnRef>
+          <a:fillRef idx="1">
+            <a:schemeClr val="accent1"/>
+          </a:fillRef>
+          <a:effectRef idx="0">
+            <a:schemeClr val="accent1"/>
+          </a:effectRef>
+          <a:fontRef idx="minor">
+            <a:schemeClr val="lt1"/>
+          </a:fontRef>
+        </p:style>
+        <p:txBody>
+          <a:bodyPr rtlCol="0" anchor="ctr"/>
+          <a:lstStyle/>
+          <a:p>
+            <a:pPr algn="ctr"/>
+            <a:r>
+              <a:rPr lang="en-US" dirty="0">
+                <a:solidFill>
+                  <a:schemeClr val="tx2">
+                    <a:lumMod val="25000"/>
+                    <a:lumOff val="75000"/>
+                  </a:schemeClr>
+                </a:solidFill>
+              </a:rPr>
+              <a:t>Gture Agent Studio</a:t>
+            </a:r>
+          </a:p>
+        </p:txBody>
+      </p:sp>
+      <p:sp>
+        <p:nvSpPr>
+          <p:cNvPr id="6" name="TextBox 5">
+            <a:extLst>
+              <a:ext uri="{FF2B5EF4-FFF2-40B4-BE49-F238E27FC236}">
+                <a16:creationId xmlns:a16="http://schemas.microsoft.com/office/drawing/2014/main" id="{A706F744-C3CA-4099-AC50-E73D70E0F508}"/>
+              </a:ext>
+            </a:extLst>
+          </p:cNvPr>
+          <p:cNvSpPr txBox="1"/>
+          <p:nvPr/>
+        </p:nvSpPr>
+        <p:spPr>
+          <a:xfrm>
+            <a:off x="240859" y="2675330"/>
+            <a:ext cx="2058682" cy="276999"/>
+          </a:xfrm>
+          <a:prstGeom prst="rect">
+            <a:avLst/>
+          </a:prstGeom>
+          <a:noFill/>
+        </p:spPr>
+        <p:txBody>
+          <a:bodyPr wrap="square" rtlCol="0">
+            <a:spAutoFit/>
+          </a:bodyPr>
+          <a:lstStyle/>
+          <a:p>
+            <a:pPr algn="ctr"/>
+            <a:r>
+              <a:rPr lang="en-US" sz="1200" dirty="0">
+                <a:solidFill>
+                  <a:schemeClr val="bg1"/>
+                </a:solidFill>
+                <a:latin typeface="Avenir Book" panose="02000503020000020003" pitchFamily="2" charset="0"/>
+              </a:rPr>
+              <a:t>Company A Users</a:t>
+            </a:r>
+          </a:p>
+        </p:txBody>
+      </p:sp>
+      <p:cxnSp>
+        <p:nvCxnSpPr>
+          <p:cNvPr id="19" name="Elbow Connector 18">
+            <a:extLst>
+              <a:ext uri="{FF2B5EF4-FFF2-40B4-BE49-F238E27FC236}">
+                <a16:creationId xmlns:a16="http://schemas.microsoft.com/office/drawing/2014/main" id="{7DC1CA0F-2193-3828-933E-7435B7F4294C}"/>
+              </a:ext>
+            </a:extLst>
+          </p:cNvPr>
+          <p:cNvCxnSpPr>
+            <a:cxnSpLocks/>
+          </p:cNvCxnSpPr>
+          <p:nvPr/>
+        </p:nvCxnSpPr>
+        <p:spPr>
+          <a:xfrm>
+            <a:off x="2352720" y="2112434"/>
+            <a:ext cx="4771773" cy="1384248"/>
+          </a:xfrm>
+          <a:prstGeom prst="bentConnector3">
+            <a:avLst>
+              <a:gd name="adj1" fmla="val 90776"/>
+            </a:avLst>
+          </a:prstGeom>
+          <a:ln>
+            <a:solidFill>
+              <a:schemeClr val="tx2">
+                <a:lumMod val="25000"/>
+                <a:lumOff val="75000"/>
+              </a:schemeClr>
+            </a:solidFill>
+            <a:headEnd type="triangle"/>
+            <a:tailEnd type="triangle"/>
+          </a:ln>
+        </p:spPr>
+        <p:style>
+          <a:lnRef idx="2">
+            <a:schemeClr val="accent1"/>
+          </a:lnRef>
+          <a:fillRef idx="0">
+            <a:schemeClr val="accent1"/>
+          </a:fillRef>
+          <a:effectRef idx="1">
+            <a:schemeClr val="accent1"/>
+          </a:effectRef>
+          <a:fontRef idx="minor">
+            <a:schemeClr val="tx1"/>
+          </a:fontRef>
+        </p:style>
+      </p:cxnSp>
+      <p:cxnSp>
+        <p:nvCxnSpPr>
+          <p:cNvPr id="3" name="Straight Arrow Connector 2">
+            <a:extLst>
+              <a:ext uri="{FF2B5EF4-FFF2-40B4-BE49-F238E27FC236}">
+                <a16:creationId xmlns:a16="http://schemas.microsoft.com/office/drawing/2014/main" id="{639A30AA-12A0-C356-2EE3-79F00581C753}"/>
+              </a:ext>
+            </a:extLst>
+          </p:cNvPr>
+          <p:cNvCxnSpPr>
+            <a:cxnSpLocks/>
+          </p:cNvCxnSpPr>
+          <p:nvPr/>
+        </p:nvCxnSpPr>
+        <p:spPr>
+          <a:xfrm>
+            <a:off x="9186530" y="5782627"/>
+            <a:ext cx="691117" cy="0"/>
+          </a:xfrm>
+          <a:prstGeom prst="straightConnector1">
+            <a:avLst/>
+          </a:prstGeom>
+          <a:ln>
+            <a:solidFill>
+              <a:schemeClr val="bg1"/>
+            </a:solidFill>
+            <a:headEnd type="triangle"/>
+            <a:tailEnd type="triangle"/>
+          </a:ln>
+        </p:spPr>
+        <p:style>
+          <a:lnRef idx="2">
+            <a:schemeClr val="accent1"/>
+          </a:lnRef>
+          <a:fillRef idx="0">
+            <a:schemeClr val="accent1"/>
+          </a:fillRef>
+          <a:effectRef idx="1">
+            <a:schemeClr val="accent1"/>
+          </a:effectRef>
+          <a:fontRef idx="minor">
+            <a:schemeClr val="tx1"/>
+          </a:fontRef>
+        </p:style>
+      </p:cxnSp>
+      <p:pic>
+        <p:nvPicPr>
+          <p:cNvPr id="4" name="Graphic 3" descr="Artificial Intelligence with solid fill">
+            <a:extLst>
+              <a:ext uri="{FF2B5EF4-FFF2-40B4-BE49-F238E27FC236}">
+                <a16:creationId xmlns:a16="http://schemas.microsoft.com/office/drawing/2014/main" id="{B64DA739-0618-325F-F96E-FDFB27B8571A}"/>
+              </a:ext>
+            </a:extLst>
+          </p:cNvPr>
+          <p:cNvPicPr>
+            <a:picLocks noChangeAspect="1"/>
+          </p:cNvPicPr>
+          <p:nvPr/>
+        </p:nvPicPr>
+        <p:blipFill>
+          <a:blip r:embed="rId4">
+            <a:extLst>
+              <a:ext uri="{96DAC541-7B7A-43D3-8B79-37D633B846F1}">
+                <asvg:svgBlip xmlns:asvg="http://schemas.microsoft.com/office/drawing/2016/SVG/main" r:embed="rId5"/>
+              </a:ext>
+            </a:extLst>
+          </a:blip>
+          <a:stretch>
+            <a:fillRect/>
+          </a:stretch>
+        </p:blipFill>
+        <p:spPr>
+          <a:xfrm>
+            <a:off x="10635715" y="5307518"/>
+            <a:ext cx="549643" cy="549643"/>
+          </a:xfrm>
+          <a:prstGeom prst="rect">
+            <a:avLst/>
+          </a:prstGeom>
+        </p:spPr>
+      </p:pic>
+      <p:pic>
+        <p:nvPicPr>
+          <p:cNvPr id="5" name="Graphic 4" descr="Artificial Intelligence with solid fill">
+            <a:extLst>
+              <a:ext uri="{FF2B5EF4-FFF2-40B4-BE49-F238E27FC236}">
+                <a16:creationId xmlns:a16="http://schemas.microsoft.com/office/drawing/2014/main" id="{365F68AF-18A8-3037-4E0A-299405FEA539}"/>
+              </a:ext>
+            </a:extLst>
+          </p:cNvPr>
+          <p:cNvPicPr>
+            <a:picLocks noChangeAspect="1"/>
+          </p:cNvPicPr>
+          <p:nvPr/>
+        </p:nvPicPr>
+        <p:blipFill>
+          <a:blip r:embed="rId4">
+            <a:extLst>
+              <a:ext uri="{96DAC541-7B7A-43D3-8B79-37D633B846F1}">
+                <asvg:svgBlip xmlns:asvg="http://schemas.microsoft.com/office/drawing/2016/SVG/main" r:embed="rId5"/>
+              </a:ext>
+            </a:extLst>
+          </a:blip>
+          <a:stretch>
+            <a:fillRect/>
+          </a:stretch>
+        </p:blipFill>
+        <p:spPr>
+          <a:xfrm>
+            <a:off x="10788115" y="5459918"/>
+            <a:ext cx="549643" cy="549643"/>
+          </a:xfrm>
+          <a:prstGeom prst="rect">
+            <a:avLst/>
+          </a:prstGeom>
+        </p:spPr>
+      </p:pic>
+      <p:sp>
+        <p:nvSpPr>
+          <p:cNvPr id="18" name="TextBox 17">
+            <a:extLst>
+              <a:ext uri="{FF2B5EF4-FFF2-40B4-BE49-F238E27FC236}">
+                <a16:creationId xmlns:a16="http://schemas.microsoft.com/office/drawing/2014/main" id="{74B65387-8822-7CE2-AE09-E6F7E77C144D}"/>
+              </a:ext>
+            </a:extLst>
+          </p:cNvPr>
+          <p:cNvSpPr txBox="1"/>
+          <p:nvPr/>
+        </p:nvSpPr>
+        <p:spPr>
+          <a:xfrm>
+            <a:off x="10494219" y="6095993"/>
+            <a:ext cx="1248416" cy="461665"/>
+          </a:xfrm>
+          <a:prstGeom prst="rect">
+            <a:avLst/>
+          </a:prstGeom>
+          <a:noFill/>
+        </p:spPr>
+        <p:txBody>
+          <a:bodyPr wrap="square" rtlCol="0">
+            <a:spAutoFit/>
+          </a:bodyPr>
+          <a:lstStyle/>
+          <a:p>
+            <a:pPr algn="ctr"/>
+            <a:r>
+              <a:rPr lang="en-US" sz="1200" dirty="0">
+                <a:solidFill>
+                  <a:schemeClr val="bg1"/>
+                </a:solidFill>
+                <a:latin typeface="Avenir Book" panose="02000503020000020003" pitchFamily="2" charset="0"/>
+              </a:rPr>
+              <a:t>Company B</a:t>
+            </a:r>
+          </a:p>
+          <a:p>
+            <a:pPr algn="ctr"/>
+            <a:r>
+              <a:rPr lang="en-US" sz="1200" dirty="0">
+                <a:solidFill>
+                  <a:schemeClr val="bg1"/>
+                </a:solidFill>
+                <a:latin typeface="Avenir Book" panose="02000503020000020003" pitchFamily="2" charset="0"/>
+              </a:rPr>
+              <a:t> AI Agents</a:t>
+            </a:r>
+          </a:p>
+        </p:txBody>
+      </p:sp>
+      <p:sp>
+        <p:nvSpPr>
+          <p:cNvPr id="31" name="Rounded Rectangle 30">
+            <a:extLst>
+              <a:ext uri="{FF2B5EF4-FFF2-40B4-BE49-F238E27FC236}">
+                <a16:creationId xmlns:a16="http://schemas.microsoft.com/office/drawing/2014/main" id="{7B2EA896-552C-A162-4D8E-BCD48B771AA5}"/>
+              </a:ext>
+            </a:extLst>
+          </p:cNvPr>
+          <p:cNvSpPr/>
+          <p:nvPr/>
+        </p:nvSpPr>
+        <p:spPr>
+          <a:xfrm rot="5400000">
+            <a:off x="9478334" y="5561240"/>
+            <a:ext cx="1514417" cy="410995"/>
+          </a:xfrm>
+          <a:prstGeom prst="roundRect">
+            <a:avLst/>
+          </a:prstGeom>
+          <a:noFill/>
+          <a:ln>
+            <a:solidFill>
+              <a:schemeClr val="tx2">
+                <a:lumMod val="25000"/>
+                <a:lumOff val="75000"/>
+              </a:schemeClr>
+            </a:solidFill>
+          </a:ln>
+        </p:spPr>
+        <p:style>
+          <a:lnRef idx="2">
+            <a:schemeClr val="accent1">
+              <a:shade val="15000"/>
+            </a:schemeClr>
+          </a:lnRef>
+          <a:fillRef idx="1">
+            <a:schemeClr val="accent1"/>
+          </a:fillRef>
+          <a:effectRef idx="0">
+            <a:schemeClr val="accent1"/>
+          </a:effectRef>
+          <a:fontRef idx="minor">
+            <a:schemeClr val="lt1"/>
+          </a:fontRef>
+        </p:style>
+        <p:txBody>
+          <a:bodyPr rtlCol="0" anchor="ctr"/>
+          <a:lstStyle/>
+          <a:p>
+            <a:pPr algn="ctr"/>
+            <a:r>
+              <a:rPr lang="en-US" dirty="0">
+                <a:solidFill>
+                  <a:schemeClr val="tx2">
+                    <a:lumMod val="25000"/>
+                    <a:lumOff val="75000"/>
+                  </a:schemeClr>
+                </a:solidFill>
+              </a:rPr>
+              <a:t>Lib </a:t>
+            </a:r>
+          </a:p>
+        </p:txBody>
+      </p:sp>
+      <p:sp>
+        <p:nvSpPr>
+          <p:cNvPr id="32" name="TextBox 31">
+            <a:extLst>
+              <a:ext uri="{FF2B5EF4-FFF2-40B4-BE49-F238E27FC236}">
+                <a16:creationId xmlns:a16="http://schemas.microsoft.com/office/drawing/2014/main" id="{7C393C61-72C9-A218-39CF-A00F8A49BCD7}"/>
+              </a:ext>
+            </a:extLst>
+          </p:cNvPr>
+          <p:cNvSpPr txBox="1"/>
+          <p:nvPr/>
+        </p:nvSpPr>
+        <p:spPr>
+          <a:xfrm>
+            <a:off x="240859" y="3094571"/>
+            <a:ext cx="2058682" cy="276999"/>
+          </a:xfrm>
+          <a:prstGeom prst="rect">
+            <a:avLst/>
+          </a:prstGeom>
+          <a:noFill/>
+        </p:spPr>
+        <p:txBody>
+          <a:bodyPr wrap="square" rtlCol="0">
+            <a:spAutoFit/>
+          </a:bodyPr>
+          <a:lstStyle/>
+          <a:p>
+            <a:pPr algn="ctr"/>
+            <a:r>
+              <a:rPr lang="en-US" sz="1200" dirty="0">
+                <a:solidFill>
+                  <a:schemeClr val="bg1"/>
+                </a:solidFill>
+                <a:latin typeface="Avenir Book" panose="02000503020000020003" pitchFamily="2" charset="0"/>
+              </a:rPr>
+              <a:t>Company B Users</a:t>
+            </a:r>
+          </a:p>
+        </p:txBody>
+      </p:sp>
+    </p:spTree>
+    <p:extLst>
+      <p:ext uri="{BB962C8B-B14F-4D97-AF65-F5344CB8AC3E}">
+        <p14:creationId xmlns:p14="http://schemas.microsoft.com/office/powerpoint/2010/main" val="2816515535"/>
+      </p:ext>
+    </p:extLst>
+  </p:cSld>
+  <p:clrMapOvr>
+    <a:masterClrMapping/>
+  </p:clrMapOvr>
+</p:sld>
+</file>
+
+<file path=ppt/slides/slide6.xml><?xml version="1.0" encoding="utf-8"?>
+<p:sld xmlns:a="http://schemas.openxmlformats.org/drawingml/2006/main" xmlns:r="http://schemas.openxmlformats.org/officeDocument/2006/relationships" xmlns:p="http://schemas.openxmlformats.org/presentationml/2006/main">
+  <p:cSld>
+    <p:bg>
+      <p:bgPr>
+        <a:solidFill>
+          <a:schemeClr val="tx1">
+            <a:lumMod val="85000"/>
+            <a:lumOff val="15000"/>
+          </a:schemeClr>
+        </a:solidFill>
+        <a:effectLst/>
+      </p:bgPr>
+    </p:bg>
+    <p:spTree>
+      <p:nvGrpSpPr>
+        <p:cNvPr id="1" name="">
+          <a:extLst>
+            <a:ext uri="{FF2B5EF4-FFF2-40B4-BE49-F238E27FC236}">
+              <a16:creationId xmlns:a16="http://schemas.microsoft.com/office/drawing/2014/main" id="{460A94F8-A713-E404-6350-4A213CCEFAD7}"/>
+            </a:ext>
+          </a:extLst>
+        </p:cNvPr>
+        <p:cNvGrpSpPr/>
+        <p:nvPr/>
+      </p:nvGrpSpPr>
+      <p:grpSpPr>
+        <a:xfrm>
+          <a:off x="0" y="0"/>
+          <a:ext cx="0" cy="0"/>
+          <a:chOff x="0" y="0"/>
+          <a:chExt cx="0" cy="0"/>
+        </a:xfrm>
+      </p:grpSpPr>
+      <p:pic>
+        <p:nvPicPr>
+          <p:cNvPr id="12" name="Graphic 11" descr="Server with solid fill">
+            <a:extLst>
+              <a:ext uri="{FF2B5EF4-FFF2-40B4-BE49-F238E27FC236}">
+                <a16:creationId xmlns:a16="http://schemas.microsoft.com/office/drawing/2014/main" id="{206F8CBF-D475-F3A2-B19F-2DB947580C39}"/>
+              </a:ext>
+            </a:extLst>
+          </p:cNvPr>
+          <p:cNvPicPr>
+            <a:picLocks noChangeAspect="1"/>
+          </p:cNvPicPr>
+          <p:nvPr/>
+        </p:nvPicPr>
+        <p:blipFill>
+          <a:blip r:embed="rId2">
+            <a:extLst>
+              <a:ext uri="{96DAC541-7B7A-43D3-8B79-37D633B846F1}">
+                <asvg:svgBlip xmlns:asvg="http://schemas.microsoft.com/office/drawing/2016/SVG/main" r:embed="rId3"/>
+              </a:ext>
+            </a:extLst>
+          </a:blip>
+          <a:stretch>
+            <a:fillRect/>
+          </a:stretch>
+        </p:blipFill>
+        <p:spPr>
+          <a:xfrm>
+            <a:off x="7664393" y="3233071"/>
+            <a:ext cx="926974" cy="926974"/>
+          </a:xfrm>
+          <a:prstGeom prst="rect">
+            <a:avLst/>
+          </a:prstGeom>
+        </p:spPr>
+      </p:pic>
+      <p:sp>
+        <p:nvSpPr>
+          <p:cNvPr id="15" name="TextBox 14">
+            <a:extLst>
+              <a:ext uri="{FF2B5EF4-FFF2-40B4-BE49-F238E27FC236}">
+                <a16:creationId xmlns:a16="http://schemas.microsoft.com/office/drawing/2014/main" id="{04FDB20D-70F2-A9E6-21C2-653057547A76}"/>
+              </a:ext>
+            </a:extLst>
+          </p:cNvPr>
+          <p:cNvSpPr txBox="1"/>
+          <p:nvPr/>
+        </p:nvSpPr>
+        <p:spPr>
+          <a:xfrm>
+            <a:off x="7276915" y="4140195"/>
+            <a:ext cx="1757193" cy="646331"/>
+          </a:xfrm>
+          <a:prstGeom prst="rect">
+            <a:avLst/>
+          </a:prstGeom>
+          <a:noFill/>
+        </p:spPr>
+        <p:txBody>
+          <a:bodyPr wrap="square" rtlCol="0">
+            <a:spAutoFit/>
+          </a:bodyPr>
+          <a:lstStyle/>
+          <a:p>
+            <a:pPr algn="ctr"/>
+            <a:r>
+              <a:rPr lang="en-US" dirty="0">
+                <a:solidFill>
+                  <a:schemeClr val="tx2">
+                    <a:lumMod val="25000"/>
+                    <a:lumOff val="75000"/>
+                  </a:schemeClr>
+                </a:solidFill>
+                <a:latin typeface="Avenir Book" panose="02000503020000020003" pitchFamily="2" charset="0"/>
+              </a:rPr>
+              <a:t>Gture platform server</a:t>
+            </a:r>
+          </a:p>
+        </p:txBody>
+      </p:sp>
+      <p:cxnSp>
+        <p:nvCxnSpPr>
+          <p:cNvPr id="22" name="Straight Arrow Connector 21">
+            <a:extLst>
+              <a:ext uri="{FF2B5EF4-FFF2-40B4-BE49-F238E27FC236}">
+                <a16:creationId xmlns:a16="http://schemas.microsoft.com/office/drawing/2014/main" id="{BE282910-D6BB-4553-9CB2-D09219E2E752}"/>
+              </a:ext>
+            </a:extLst>
+          </p:cNvPr>
+          <p:cNvCxnSpPr>
+            <a:cxnSpLocks/>
+          </p:cNvCxnSpPr>
+          <p:nvPr/>
+        </p:nvCxnSpPr>
+        <p:spPr>
+          <a:xfrm>
+            <a:off x="9186530" y="3846679"/>
+            <a:ext cx="691117" cy="0"/>
+          </a:xfrm>
+          <a:prstGeom prst="straightConnector1">
+            <a:avLst/>
+          </a:prstGeom>
+          <a:ln>
+            <a:solidFill>
+              <a:schemeClr val="tx2">
+                <a:lumMod val="25000"/>
+                <a:lumOff val="75000"/>
+              </a:schemeClr>
+            </a:solidFill>
+            <a:headEnd type="triangle"/>
+            <a:tailEnd type="triangle"/>
+          </a:ln>
+        </p:spPr>
+        <p:style>
+          <a:lnRef idx="2">
+            <a:schemeClr val="accent1"/>
+          </a:lnRef>
+          <a:fillRef idx="0">
+            <a:schemeClr val="accent1"/>
+          </a:fillRef>
+          <a:effectRef idx="1">
+            <a:schemeClr val="accent1"/>
+          </a:effectRef>
+          <a:fontRef idx="minor">
+            <a:schemeClr val="tx1"/>
+          </a:fontRef>
+        </p:style>
+      </p:cxnSp>
+      <p:pic>
+        <p:nvPicPr>
+          <p:cNvPr id="24" name="Graphic 23" descr="Artificial Intelligence with solid fill">
+            <a:extLst>
+              <a:ext uri="{FF2B5EF4-FFF2-40B4-BE49-F238E27FC236}">
+                <a16:creationId xmlns:a16="http://schemas.microsoft.com/office/drawing/2014/main" id="{FF113947-C70A-3138-7F7C-AA1B3937F26B}"/>
+              </a:ext>
+            </a:extLst>
+          </p:cNvPr>
+          <p:cNvPicPr>
+            <a:picLocks noChangeAspect="1"/>
+          </p:cNvPicPr>
+          <p:nvPr/>
+        </p:nvPicPr>
+        <p:blipFill>
+          <a:blip r:embed="rId4">
+            <a:extLst>
+              <a:ext uri="{96DAC541-7B7A-43D3-8B79-37D633B846F1}">
+                <asvg:svgBlip xmlns:asvg="http://schemas.microsoft.com/office/drawing/2016/SVG/main" r:embed="rId5"/>
+              </a:ext>
+            </a:extLst>
+          </a:blip>
+          <a:stretch>
+            <a:fillRect/>
+          </a:stretch>
+        </p:blipFill>
+        <p:spPr>
+          <a:xfrm>
+            <a:off x="10635715" y="3371570"/>
+            <a:ext cx="549643" cy="549643"/>
+          </a:xfrm>
+          <a:prstGeom prst="rect">
+            <a:avLst/>
+          </a:prstGeom>
+        </p:spPr>
+      </p:pic>
+      <p:pic>
+        <p:nvPicPr>
+          <p:cNvPr id="25" name="Graphic 24" descr="Artificial Intelligence with solid fill">
+            <a:extLst>
+              <a:ext uri="{FF2B5EF4-FFF2-40B4-BE49-F238E27FC236}">
+                <a16:creationId xmlns:a16="http://schemas.microsoft.com/office/drawing/2014/main" id="{D412FD53-A3A6-F0A2-861C-50C7148B8149}"/>
+              </a:ext>
+            </a:extLst>
+          </p:cNvPr>
+          <p:cNvPicPr>
+            <a:picLocks noChangeAspect="1"/>
+          </p:cNvPicPr>
+          <p:nvPr/>
+        </p:nvPicPr>
+        <p:blipFill>
+          <a:blip r:embed="rId4">
+            <a:extLst>
+              <a:ext uri="{96DAC541-7B7A-43D3-8B79-37D633B846F1}">
+                <asvg:svgBlip xmlns:asvg="http://schemas.microsoft.com/office/drawing/2016/SVG/main" r:embed="rId5"/>
+              </a:ext>
+            </a:extLst>
+          </a:blip>
+          <a:stretch>
+            <a:fillRect/>
+          </a:stretch>
+        </p:blipFill>
+        <p:spPr>
+          <a:xfrm>
+            <a:off x="10788115" y="3523970"/>
+            <a:ext cx="549643" cy="549643"/>
+          </a:xfrm>
+          <a:prstGeom prst="rect">
+            <a:avLst/>
+          </a:prstGeom>
+        </p:spPr>
+      </p:pic>
+      <p:sp>
+        <p:nvSpPr>
+          <p:cNvPr id="26" name="TextBox 25">
+            <a:extLst>
+              <a:ext uri="{FF2B5EF4-FFF2-40B4-BE49-F238E27FC236}">
+                <a16:creationId xmlns:a16="http://schemas.microsoft.com/office/drawing/2014/main" id="{BB0B7A54-A219-8DBA-1FCD-6D88E984D75D}"/>
+              </a:ext>
+            </a:extLst>
+          </p:cNvPr>
+          <p:cNvSpPr txBox="1"/>
+          <p:nvPr/>
+        </p:nvSpPr>
+        <p:spPr>
+          <a:xfrm>
+            <a:off x="10494219" y="4160045"/>
+            <a:ext cx="1248416" cy="461665"/>
+          </a:xfrm>
+          <a:prstGeom prst="rect">
+            <a:avLst/>
+          </a:prstGeom>
+          <a:noFill/>
+        </p:spPr>
+        <p:txBody>
+          <a:bodyPr wrap="square" rtlCol="0">
+            <a:spAutoFit/>
+          </a:bodyPr>
+          <a:lstStyle/>
+          <a:p>
+            <a:pPr algn="ctr"/>
+            <a:r>
+              <a:rPr lang="en-US" sz="1200" dirty="0">
+                <a:solidFill>
+                  <a:schemeClr val="tx2">
+                    <a:lumMod val="25000"/>
+                    <a:lumOff val="75000"/>
+                  </a:schemeClr>
+                </a:solidFill>
+                <a:latin typeface="Avenir Book" panose="02000503020000020003" pitchFamily="2" charset="0"/>
+              </a:rPr>
+              <a:t>Company A</a:t>
+            </a:r>
+          </a:p>
+          <a:p>
+            <a:pPr algn="ctr"/>
+            <a:r>
+              <a:rPr lang="en-US" sz="1200" dirty="0">
+                <a:solidFill>
+                  <a:schemeClr val="tx2">
+                    <a:lumMod val="25000"/>
+                    <a:lumOff val="75000"/>
+                  </a:schemeClr>
+                </a:solidFill>
+                <a:latin typeface="Avenir Book" panose="02000503020000020003" pitchFamily="2" charset="0"/>
+              </a:rPr>
+              <a:t> AI Agents</a:t>
+            </a:r>
+          </a:p>
+        </p:txBody>
+      </p:sp>
+      <p:sp>
+        <p:nvSpPr>
+          <p:cNvPr id="7" name="Rounded Rectangle 6">
+            <a:extLst>
+              <a:ext uri="{FF2B5EF4-FFF2-40B4-BE49-F238E27FC236}">
+                <a16:creationId xmlns:a16="http://schemas.microsoft.com/office/drawing/2014/main" id="{1D2A7B19-06A6-930C-3F4E-D90F4A66215E}"/>
+              </a:ext>
+            </a:extLst>
+          </p:cNvPr>
+          <p:cNvSpPr/>
+          <p:nvPr/>
+        </p:nvSpPr>
+        <p:spPr>
+          <a:xfrm rot="5400000">
+            <a:off x="9478334" y="3625292"/>
+            <a:ext cx="1514417" cy="410995"/>
+          </a:xfrm>
+          <a:prstGeom prst="roundRect">
+            <a:avLst/>
+          </a:prstGeom>
+          <a:noFill/>
+          <a:ln>
+            <a:solidFill>
+              <a:schemeClr val="tx2">
+                <a:lumMod val="25000"/>
+                <a:lumOff val="75000"/>
+              </a:schemeClr>
+            </a:solidFill>
+          </a:ln>
+        </p:spPr>
+        <p:style>
+          <a:lnRef idx="2">
+            <a:schemeClr val="accent1">
+              <a:shade val="15000"/>
+            </a:schemeClr>
+          </a:lnRef>
+          <a:fillRef idx="1">
+            <a:schemeClr val="accent1"/>
+          </a:fillRef>
+          <a:effectRef idx="0">
+            <a:schemeClr val="accent1"/>
+          </a:effectRef>
+          <a:fontRef idx="minor">
+            <a:schemeClr val="lt1"/>
+          </a:fontRef>
+        </p:style>
+        <p:txBody>
+          <a:bodyPr rtlCol="0" anchor="ctr"/>
+          <a:lstStyle/>
+          <a:p>
+            <a:pPr algn="ctr"/>
+            <a:r>
+              <a:rPr lang="en-US" dirty="0">
+                <a:solidFill>
+                  <a:schemeClr val="tx2">
+                    <a:lumMod val="25000"/>
+                    <a:lumOff val="75000"/>
+                  </a:schemeClr>
+                </a:solidFill>
+              </a:rPr>
+              <a:t>Lib </a:t>
+            </a:r>
+          </a:p>
+        </p:txBody>
+      </p:sp>
+      <p:sp>
+        <p:nvSpPr>
+          <p:cNvPr id="9" name="Rounded Rectangle 8">
+            <a:extLst>
+              <a:ext uri="{FF2B5EF4-FFF2-40B4-BE49-F238E27FC236}">
+                <a16:creationId xmlns:a16="http://schemas.microsoft.com/office/drawing/2014/main" id="{8A9E8CFF-6221-F8C9-A8C1-476AC78359FD}"/>
+              </a:ext>
+            </a:extLst>
+          </p:cNvPr>
+          <p:cNvSpPr/>
+          <p:nvPr/>
+        </p:nvSpPr>
+        <p:spPr>
+          <a:xfrm>
+            <a:off x="7455747" y="1791026"/>
+            <a:ext cx="1380618" cy="662275"/>
+          </a:xfrm>
+          <a:prstGeom prst="roundRect">
+            <a:avLst/>
+          </a:prstGeom>
+          <a:noFill/>
+          <a:ln>
+            <a:solidFill>
+              <a:schemeClr val="tx2">
+                <a:lumMod val="25000"/>
+                <a:lumOff val="75000"/>
+              </a:schemeClr>
+            </a:solidFill>
+          </a:ln>
+        </p:spPr>
+        <p:style>
+          <a:lnRef idx="2">
+            <a:schemeClr val="accent1">
+              <a:shade val="15000"/>
+            </a:schemeClr>
+          </a:lnRef>
+          <a:fillRef idx="1">
+            <a:schemeClr val="accent1"/>
+          </a:fillRef>
+          <a:effectRef idx="0">
+            <a:schemeClr val="accent1"/>
+          </a:effectRef>
+          <a:fontRef idx="minor">
+            <a:schemeClr val="lt1"/>
+          </a:fontRef>
+        </p:style>
+        <p:txBody>
+          <a:bodyPr rtlCol="0" anchor="ctr"/>
+          <a:lstStyle/>
+          <a:p>
+            <a:pPr algn="ctr"/>
+            <a:r>
+              <a:rPr lang="en-US" dirty="0">
+                <a:solidFill>
+                  <a:schemeClr val="tx2">
+                    <a:lumMod val="25000"/>
+                    <a:lumOff val="75000"/>
+                  </a:schemeClr>
+                </a:solidFill>
+              </a:rPr>
+              <a:t>Gture Dev Portal</a:t>
+            </a:r>
+          </a:p>
+        </p:txBody>
+      </p:sp>
+      <p:cxnSp>
+        <p:nvCxnSpPr>
+          <p:cNvPr id="11" name="Straight Arrow Connector 10">
+            <a:extLst>
+              <a:ext uri="{FF2B5EF4-FFF2-40B4-BE49-F238E27FC236}">
+                <a16:creationId xmlns:a16="http://schemas.microsoft.com/office/drawing/2014/main" id="{D62CF1EA-7272-C9F1-D4D2-72636B169C6B}"/>
+              </a:ext>
+            </a:extLst>
+          </p:cNvPr>
+          <p:cNvCxnSpPr>
+            <a:cxnSpLocks/>
+          </p:cNvCxnSpPr>
+          <p:nvPr/>
+        </p:nvCxnSpPr>
+        <p:spPr>
+          <a:xfrm>
+            <a:off x="8142838" y="2536875"/>
+            <a:ext cx="0" cy="483541"/>
+          </a:xfrm>
+          <a:prstGeom prst="straightConnector1">
+            <a:avLst/>
+          </a:prstGeom>
+          <a:ln>
+            <a:solidFill>
+              <a:schemeClr val="tx2">
+                <a:lumMod val="25000"/>
+                <a:lumOff val="75000"/>
+              </a:schemeClr>
+            </a:solidFill>
+            <a:headEnd type="triangle"/>
+            <a:tailEnd type="triangle"/>
+          </a:ln>
+        </p:spPr>
+        <p:style>
+          <a:lnRef idx="2">
+            <a:schemeClr val="accent1"/>
+          </a:lnRef>
+          <a:fillRef idx="0">
+            <a:schemeClr val="accent1"/>
+          </a:fillRef>
+          <a:effectRef idx="1">
+            <a:schemeClr val="accent1"/>
+          </a:effectRef>
+          <a:fontRef idx="minor">
+            <a:schemeClr val="tx1"/>
+          </a:fontRef>
+        </p:style>
+      </p:cxnSp>
+      <p:sp>
+        <p:nvSpPr>
+          <p:cNvPr id="29" name="Rounded Rectangle 28">
+            <a:extLst>
+              <a:ext uri="{FF2B5EF4-FFF2-40B4-BE49-F238E27FC236}">
+                <a16:creationId xmlns:a16="http://schemas.microsoft.com/office/drawing/2014/main" id="{FCD47747-BDFB-36FB-E462-6DC69D19C3B9}"/>
+              </a:ext>
+            </a:extLst>
+          </p:cNvPr>
+          <p:cNvSpPr/>
+          <p:nvPr/>
+        </p:nvSpPr>
+        <p:spPr>
+          <a:xfrm>
+            <a:off x="7276915" y="3108196"/>
+            <a:ext cx="1757193" cy="3250559"/>
+          </a:xfrm>
+          <a:prstGeom prst="roundRect">
+            <a:avLst>
+              <a:gd name="adj" fmla="val 6608"/>
+            </a:avLst>
+          </a:prstGeom>
+          <a:noFill/>
+          <a:ln>
+            <a:solidFill>
+              <a:schemeClr val="tx2">
+                <a:lumMod val="25000"/>
+                <a:lumOff val="75000"/>
+              </a:schemeClr>
+            </a:solidFill>
+          </a:ln>
+        </p:spPr>
+        <p:style>
+          <a:lnRef idx="2">
+            <a:schemeClr val="accent1">
+              <a:shade val="15000"/>
+            </a:schemeClr>
+          </a:lnRef>
+          <a:fillRef idx="1">
+            <a:schemeClr val="accent1"/>
+          </a:fillRef>
+          <a:effectRef idx="0">
+            <a:schemeClr val="accent1"/>
+          </a:effectRef>
+          <a:fontRef idx="minor">
+            <a:schemeClr val="lt1"/>
+          </a:fontRef>
+        </p:style>
+        <p:txBody>
+          <a:bodyPr rtlCol="0" anchor="ctr"/>
+          <a:lstStyle/>
+          <a:p>
+            <a:pPr algn="ctr"/>
+            <a:endParaRPr lang="en-US" dirty="0">
+              <a:solidFill>
+                <a:schemeClr val="tx2">
+                  <a:lumMod val="25000"/>
+                  <a:lumOff val="75000"/>
+                </a:schemeClr>
+              </a:solidFill>
+            </a:endParaRPr>
+          </a:p>
+        </p:txBody>
+      </p:sp>
+      <p:sp>
+        <p:nvSpPr>
+          <p:cNvPr id="2" name="Rounded Rectangle 1">
+            <a:extLst>
+              <a:ext uri="{FF2B5EF4-FFF2-40B4-BE49-F238E27FC236}">
+                <a16:creationId xmlns:a16="http://schemas.microsoft.com/office/drawing/2014/main" id="{6AEF68CF-64E1-B131-FE42-F5368A5F23A9}"/>
+              </a:ext>
+            </a:extLst>
+          </p:cNvPr>
+          <p:cNvSpPr/>
+          <p:nvPr/>
+        </p:nvSpPr>
+        <p:spPr>
+          <a:xfrm>
+            <a:off x="527440" y="1791025"/>
+            <a:ext cx="1586753" cy="662275"/>
+          </a:xfrm>
+          <a:prstGeom prst="roundRect">
+            <a:avLst/>
+          </a:prstGeom>
+          <a:noFill/>
+          <a:ln>
+            <a:solidFill>
+              <a:schemeClr val="tx2">
+                <a:lumMod val="25000"/>
+                <a:lumOff val="75000"/>
+              </a:schemeClr>
+            </a:solidFill>
+          </a:ln>
+        </p:spPr>
+        <p:style>
+          <a:lnRef idx="2">
+            <a:schemeClr val="accent1">
+              <a:shade val="15000"/>
+            </a:schemeClr>
+          </a:lnRef>
+          <a:fillRef idx="1">
+            <a:schemeClr val="accent1"/>
+          </a:fillRef>
+          <a:effectRef idx="0">
+            <a:schemeClr val="accent1"/>
+          </a:effectRef>
+          <a:fontRef idx="minor">
+            <a:schemeClr val="lt1"/>
+          </a:fontRef>
+        </p:style>
+        <p:txBody>
+          <a:bodyPr rtlCol="0" anchor="ctr"/>
+          <a:lstStyle/>
+          <a:p>
+            <a:pPr algn="ctr"/>
+            <a:r>
+              <a:rPr lang="en-US" dirty="0">
+                <a:solidFill>
+                  <a:schemeClr val="tx2">
+                    <a:lumMod val="25000"/>
+                    <a:lumOff val="75000"/>
+                  </a:schemeClr>
+                </a:solidFill>
+              </a:rPr>
+              <a:t>Gture Agent Studio</a:t>
+            </a:r>
+          </a:p>
+        </p:txBody>
+      </p:sp>
+      <p:sp>
+        <p:nvSpPr>
+          <p:cNvPr id="6" name="TextBox 5">
+            <a:extLst>
+              <a:ext uri="{FF2B5EF4-FFF2-40B4-BE49-F238E27FC236}">
+                <a16:creationId xmlns:a16="http://schemas.microsoft.com/office/drawing/2014/main" id="{1B4E7ECF-80B1-77A3-A059-E8662607D72D}"/>
+              </a:ext>
+            </a:extLst>
+          </p:cNvPr>
+          <p:cNvSpPr txBox="1"/>
+          <p:nvPr/>
+        </p:nvSpPr>
+        <p:spPr>
+          <a:xfrm>
+            <a:off x="240859" y="2520723"/>
+            <a:ext cx="2058682" cy="276999"/>
+          </a:xfrm>
+          <a:prstGeom prst="rect">
+            <a:avLst/>
+          </a:prstGeom>
+          <a:noFill/>
+        </p:spPr>
+        <p:txBody>
+          <a:bodyPr wrap="square" rtlCol="0">
+            <a:spAutoFit/>
+          </a:bodyPr>
+          <a:lstStyle/>
+          <a:p>
+            <a:pPr algn="ctr"/>
+            <a:r>
+              <a:rPr lang="en-US" sz="1200" dirty="0">
+                <a:solidFill>
+                  <a:schemeClr val="tx2">
+                    <a:lumMod val="25000"/>
+                    <a:lumOff val="75000"/>
+                  </a:schemeClr>
+                </a:solidFill>
+                <a:latin typeface="Avenir Book" panose="02000503020000020003" pitchFamily="2" charset="0"/>
+              </a:rPr>
+              <a:t>Company A Users</a:t>
+            </a:r>
+          </a:p>
+        </p:txBody>
+      </p:sp>
+      <p:cxnSp>
+        <p:nvCxnSpPr>
+          <p:cNvPr id="19" name="Elbow Connector 18">
+            <a:extLst>
+              <a:ext uri="{FF2B5EF4-FFF2-40B4-BE49-F238E27FC236}">
+                <a16:creationId xmlns:a16="http://schemas.microsoft.com/office/drawing/2014/main" id="{00BE40DD-B177-34AC-0023-6F82D471E729}"/>
+              </a:ext>
+            </a:extLst>
+          </p:cNvPr>
+          <p:cNvCxnSpPr>
+            <a:cxnSpLocks/>
+          </p:cNvCxnSpPr>
+          <p:nvPr/>
+        </p:nvCxnSpPr>
+        <p:spPr>
+          <a:xfrm>
+            <a:off x="2352720" y="2112434"/>
+            <a:ext cx="4771773" cy="1384248"/>
+          </a:xfrm>
+          <a:prstGeom prst="bentConnector3">
+            <a:avLst>
+              <a:gd name="adj1" fmla="val 90776"/>
+            </a:avLst>
+          </a:prstGeom>
+          <a:ln>
+            <a:solidFill>
+              <a:schemeClr val="tx2">
+                <a:lumMod val="25000"/>
+                <a:lumOff val="75000"/>
+              </a:schemeClr>
+            </a:solidFill>
+            <a:headEnd type="triangle"/>
+            <a:tailEnd type="triangle"/>
+          </a:ln>
+        </p:spPr>
+        <p:style>
+          <a:lnRef idx="2">
+            <a:schemeClr val="accent1"/>
+          </a:lnRef>
+          <a:fillRef idx="0">
+            <a:schemeClr val="accent1"/>
+          </a:fillRef>
+          <a:effectRef idx="1">
+            <a:schemeClr val="accent1"/>
+          </a:effectRef>
+          <a:fontRef idx="minor">
+            <a:schemeClr val="tx1"/>
+          </a:fontRef>
+        </p:style>
+      </p:cxnSp>
+      <p:cxnSp>
+        <p:nvCxnSpPr>
+          <p:cNvPr id="3" name="Straight Arrow Connector 2">
+            <a:extLst>
+              <a:ext uri="{FF2B5EF4-FFF2-40B4-BE49-F238E27FC236}">
+                <a16:creationId xmlns:a16="http://schemas.microsoft.com/office/drawing/2014/main" id="{3BACAE55-0A7D-D2CC-35CA-8A14E3423DEA}"/>
+              </a:ext>
+            </a:extLst>
+          </p:cNvPr>
+          <p:cNvCxnSpPr>
+            <a:cxnSpLocks/>
+          </p:cNvCxnSpPr>
+          <p:nvPr/>
+        </p:nvCxnSpPr>
+        <p:spPr>
+          <a:xfrm>
+            <a:off x="9186530" y="5782627"/>
+            <a:ext cx="691117" cy="0"/>
+          </a:xfrm>
+          <a:prstGeom prst="straightConnector1">
+            <a:avLst/>
+          </a:prstGeom>
+          <a:ln>
+            <a:solidFill>
+              <a:schemeClr val="tx2">
+                <a:lumMod val="25000"/>
+                <a:lumOff val="75000"/>
+              </a:schemeClr>
+            </a:solidFill>
+            <a:headEnd type="triangle"/>
+            <a:tailEnd type="triangle"/>
+          </a:ln>
+        </p:spPr>
+        <p:style>
+          <a:lnRef idx="2">
+            <a:schemeClr val="accent1"/>
+          </a:lnRef>
+          <a:fillRef idx="0">
+            <a:schemeClr val="accent1"/>
+          </a:fillRef>
+          <a:effectRef idx="1">
+            <a:schemeClr val="accent1"/>
+          </a:effectRef>
+          <a:fontRef idx="minor">
+            <a:schemeClr val="tx1"/>
+          </a:fontRef>
+        </p:style>
+      </p:cxnSp>
+      <p:pic>
+        <p:nvPicPr>
+          <p:cNvPr id="4" name="Graphic 3" descr="Artificial Intelligence with solid fill">
+            <a:extLst>
+              <a:ext uri="{FF2B5EF4-FFF2-40B4-BE49-F238E27FC236}">
+                <a16:creationId xmlns:a16="http://schemas.microsoft.com/office/drawing/2014/main" id="{78009C86-75EA-3014-CC96-7D0DAC5A8B41}"/>
+              </a:ext>
+            </a:extLst>
+          </p:cNvPr>
+          <p:cNvPicPr>
+            <a:picLocks noChangeAspect="1"/>
+          </p:cNvPicPr>
+          <p:nvPr/>
+        </p:nvPicPr>
+        <p:blipFill>
+          <a:blip r:embed="rId4">
+            <a:extLst>
+              <a:ext uri="{96DAC541-7B7A-43D3-8B79-37D633B846F1}">
+                <asvg:svgBlip xmlns:asvg="http://schemas.microsoft.com/office/drawing/2016/SVG/main" r:embed="rId5"/>
+              </a:ext>
+            </a:extLst>
+          </a:blip>
+          <a:stretch>
+            <a:fillRect/>
+          </a:stretch>
+        </p:blipFill>
+        <p:spPr>
+          <a:xfrm>
+            <a:off x="10635715" y="5307518"/>
+            <a:ext cx="549643" cy="549643"/>
+          </a:xfrm>
+          <a:prstGeom prst="rect">
+            <a:avLst/>
+          </a:prstGeom>
+        </p:spPr>
+      </p:pic>
+      <p:pic>
+        <p:nvPicPr>
+          <p:cNvPr id="5" name="Graphic 4" descr="Artificial Intelligence with solid fill">
+            <a:extLst>
+              <a:ext uri="{FF2B5EF4-FFF2-40B4-BE49-F238E27FC236}">
+                <a16:creationId xmlns:a16="http://schemas.microsoft.com/office/drawing/2014/main" id="{D98D5CA4-B8DA-8420-430C-9CEC14BCD71F}"/>
+              </a:ext>
+            </a:extLst>
+          </p:cNvPr>
+          <p:cNvPicPr>
+            <a:picLocks noChangeAspect="1"/>
+          </p:cNvPicPr>
+          <p:nvPr/>
+        </p:nvPicPr>
+        <p:blipFill>
+          <a:blip r:embed="rId4">
+            <a:extLst>
+              <a:ext uri="{96DAC541-7B7A-43D3-8B79-37D633B846F1}">
+                <asvg:svgBlip xmlns:asvg="http://schemas.microsoft.com/office/drawing/2016/SVG/main" r:embed="rId5"/>
+              </a:ext>
+            </a:extLst>
+          </a:blip>
+          <a:stretch>
+            <a:fillRect/>
+          </a:stretch>
+        </p:blipFill>
+        <p:spPr>
+          <a:xfrm>
+            <a:off x="10788115" y="5459918"/>
+            <a:ext cx="549643" cy="549643"/>
+          </a:xfrm>
+          <a:prstGeom prst="rect">
+            <a:avLst/>
+          </a:prstGeom>
+        </p:spPr>
+      </p:pic>
+      <p:sp>
+        <p:nvSpPr>
+          <p:cNvPr id="18" name="TextBox 17">
+            <a:extLst>
+              <a:ext uri="{FF2B5EF4-FFF2-40B4-BE49-F238E27FC236}">
+                <a16:creationId xmlns:a16="http://schemas.microsoft.com/office/drawing/2014/main" id="{76D7F2DF-9DA2-C7BF-3CB4-AEC8D290B552}"/>
+              </a:ext>
+            </a:extLst>
+          </p:cNvPr>
+          <p:cNvSpPr txBox="1"/>
+          <p:nvPr/>
+        </p:nvSpPr>
+        <p:spPr>
+          <a:xfrm>
+            <a:off x="10494219" y="6095993"/>
+            <a:ext cx="1248416" cy="461665"/>
+          </a:xfrm>
+          <a:prstGeom prst="rect">
+            <a:avLst/>
+          </a:prstGeom>
+          <a:noFill/>
+        </p:spPr>
+        <p:txBody>
+          <a:bodyPr wrap="square" rtlCol="0">
+            <a:spAutoFit/>
+          </a:bodyPr>
+          <a:lstStyle/>
+          <a:p>
+            <a:pPr algn="ctr"/>
+            <a:r>
+              <a:rPr lang="en-US" sz="1200" dirty="0">
+                <a:solidFill>
+                  <a:schemeClr val="tx2">
+                    <a:lumMod val="25000"/>
+                    <a:lumOff val="75000"/>
+                  </a:schemeClr>
+                </a:solidFill>
+                <a:latin typeface="Avenir Book" panose="02000503020000020003" pitchFamily="2" charset="0"/>
+              </a:rPr>
+              <a:t>Company B</a:t>
+            </a:r>
+          </a:p>
+          <a:p>
+            <a:pPr algn="ctr"/>
+            <a:r>
+              <a:rPr lang="en-US" sz="1200" dirty="0">
+                <a:solidFill>
+                  <a:schemeClr val="tx2">
+                    <a:lumMod val="25000"/>
+                    <a:lumOff val="75000"/>
+                  </a:schemeClr>
+                </a:solidFill>
+                <a:latin typeface="Avenir Book" panose="02000503020000020003" pitchFamily="2" charset="0"/>
+              </a:rPr>
+              <a:t> AI Agents</a:t>
+            </a:r>
+          </a:p>
+        </p:txBody>
+      </p:sp>
+      <p:sp>
+        <p:nvSpPr>
+          <p:cNvPr id="31" name="Rounded Rectangle 30">
+            <a:extLst>
+              <a:ext uri="{FF2B5EF4-FFF2-40B4-BE49-F238E27FC236}">
+                <a16:creationId xmlns:a16="http://schemas.microsoft.com/office/drawing/2014/main" id="{717B6F71-9111-F7B6-6BC8-0DE6F71A14D6}"/>
+              </a:ext>
+            </a:extLst>
+          </p:cNvPr>
+          <p:cNvSpPr/>
+          <p:nvPr/>
+        </p:nvSpPr>
+        <p:spPr>
+          <a:xfrm rot="5400000">
+            <a:off x="9478334" y="5561240"/>
+            <a:ext cx="1514417" cy="410995"/>
+          </a:xfrm>
+          <a:prstGeom prst="roundRect">
+            <a:avLst/>
+          </a:prstGeom>
+          <a:noFill/>
+          <a:ln>
+            <a:solidFill>
+              <a:schemeClr val="tx2">
+                <a:lumMod val="25000"/>
+                <a:lumOff val="75000"/>
+              </a:schemeClr>
+            </a:solidFill>
+          </a:ln>
+        </p:spPr>
+        <p:style>
+          <a:lnRef idx="2">
+            <a:schemeClr val="accent1">
+              <a:shade val="15000"/>
+            </a:schemeClr>
+          </a:lnRef>
+          <a:fillRef idx="1">
+            <a:schemeClr val="accent1"/>
+          </a:fillRef>
+          <a:effectRef idx="0">
+            <a:schemeClr val="accent1"/>
+          </a:effectRef>
+          <a:fontRef idx="minor">
+            <a:schemeClr val="lt1"/>
+          </a:fontRef>
+        </p:style>
+        <p:txBody>
+          <a:bodyPr rtlCol="0" anchor="ctr"/>
+          <a:lstStyle/>
+          <a:p>
+            <a:pPr algn="ctr"/>
+            <a:r>
+              <a:rPr lang="en-US" dirty="0">
+                <a:solidFill>
+                  <a:schemeClr val="tx2">
+                    <a:lumMod val="25000"/>
+                    <a:lumOff val="75000"/>
+                  </a:schemeClr>
+                </a:solidFill>
+              </a:rPr>
+              <a:t>Lib </a:t>
+            </a:r>
+          </a:p>
+        </p:txBody>
+      </p:sp>
+      <p:sp>
+        <p:nvSpPr>
+          <p:cNvPr id="32" name="TextBox 31">
+            <a:extLst>
+              <a:ext uri="{FF2B5EF4-FFF2-40B4-BE49-F238E27FC236}">
+                <a16:creationId xmlns:a16="http://schemas.microsoft.com/office/drawing/2014/main" id="{3BB585BE-D2B6-4506-D584-F9BDFB1617C0}"/>
+              </a:ext>
+            </a:extLst>
+          </p:cNvPr>
+          <p:cNvSpPr txBox="1"/>
+          <p:nvPr/>
+        </p:nvSpPr>
+        <p:spPr>
+          <a:xfrm>
+            <a:off x="240859" y="2770273"/>
+            <a:ext cx="2058682" cy="276999"/>
+          </a:xfrm>
+          <a:prstGeom prst="rect">
+            <a:avLst/>
+          </a:prstGeom>
+          <a:noFill/>
+        </p:spPr>
+        <p:txBody>
+          <a:bodyPr wrap="square" rtlCol="0">
+            <a:spAutoFit/>
+          </a:bodyPr>
+          <a:lstStyle/>
+          <a:p>
+            <a:pPr algn="ctr"/>
+            <a:r>
+              <a:rPr lang="en-US" sz="1200" dirty="0">
+                <a:solidFill>
+                  <a:schemeClr val="tx2">
+                    <a:lumMod val="25000"/>
+                    <a:lumOff val="75000"/>
+                  </a:schemeClr>
+                </a:solidFill>
+                <a:latin typeface="Avenir Book" panose="02000503020000020003" pitchFamily="2" charset="0"/>
+              </a:rPr>
+              <a:t>Company B Users</a:t>
+            </a:r>
+          </a:p>
+        </p:txBody>
+      </p:sp>
+      <p:pic>
+        <p:nvPicPr>
+          <p:cNvPr id="10" name="Graphic 9" descr="Server outline">
+            <a:extLst>
+              <a:ext uri="{FF2B5EF4-FFF2-40B4-BE49-F238E27FC236}">
+                <a16:creationId xmlns:a16="http://schemas.microsoft.com/office/drawing/2014/main" id="{DEB30C8D-1356-C8F1-2310-E96745668723}"/>
+              </a:ext>
+            </a:extLst>
+          </p:cNvPr>
+          <p:cNvPicPr>
+            <a:picLocks noChangeAspect="1"/>
+          </p:cNvPicPr>
+          <p:nvPr/>
+        </p:nvPicPr>
+        <p:blipFill>
+          <a:blip r:embed="rId6">
+            <a:extLst>
+              <a:ext uri="{96DAC541-7B7A-43D3-8B79-37D633B846F1}">
+                <asvg:svgBlip xmlns:asvg="http://schemas.microsoft.com/office/drawing/2016/SVG/main" r:embed="rId7"/>
+              </a:ext>
+            </a:extLst>
+          </a:blip>
+          <a:stretch>
+            <a:fillRect/>
+          </a:stretch>
+        </p:blipFill>
+        <p:spPr>
+          <a:xfrm>
+            <a:off x="3116539" y="3977377"/>
+            <a:ext cx="795797" cy="795797"/>
+          </a:xfrm>
+          <a:prstGeom prst="rect">
+            <a:avLst/>
+          </a:prstGeom>
+        </p:spPr>
+      </p:pic>
+      <p:cxnSp>
+        <p:nvCxnSpPr>
+          <p:cNvPr id="13" name="Straight Arrow Connector 12">
+            <a:extLst>
+              <a:ext uri="{FF2B5EF4-FFF2-40B4-BE49-F238E27FC236}">
+                <a16:creationId xmlns:a16="http://schemas.microsoft.com/office/drawing/2014/main" id="{4BFE0920-F2B1-38FE-7B72-262AF3EEED39}"/>
+              </a:ext>
+            </a:extLst>
+          </p:cNvPr>
+          <p:cNvCxnSpPr>
+            <a:cxnSpLocks/>
+          </p:cNvCxnSpPr>
+          <p:nvPr/>
+        </p:nvCxnSpPr>
+        <p:spPr>
+          <a:xfrm>
+            <a:off x="4159592" y="4321269"/>
+            <a:ext cx="2900427" cy="0"/>
+          </a:xfrm>
+          <a:prstGeom prst="straightConnector1">
+            <a:avLst/>
+          </a:prstGeom>
+          <a:ln>
+            <a:solidFill>
+              <a:schemeClr val="bg1"/>
+            </a:solidFill>
+            <a:headEnd type="triangle"/>
+            <a:tailEnd type="triangle"/>
+          </a:ln>
+        </p:spPr>
+        <p:style>
+          <a:lnRef idx="2">
+            <a:schemeClr val="accent1"/>
+          </a:lnRef>
+          <a:fillRef idx="0">
+            <a:schemeClr val="accent1"/>
+          </a:fillRef>
+          <a:effectRef idx="1">
+            <a:schemeClr val="accent1"/>
+          </a:effectRef>
+          <a:fontRef idx="minor">
+            <a:schemeClr val="tx1"/>
+          </a:fontRef>
+        </p:style>
+      </p:cxnSp>
+      <p:cxnSp>
+        <p:nvCxnSpPr>
+          <p:cNvPr id="17" name="Straight Arrow Connector 16">
+            <a:extLst>
+              <a:ext uri="{FF2B5EF4-FFF2-40B4-BE49-F238E27FC236}">
+                <a16:creationId xmlns:a16="http://schemas.microsoft.com/office/drawing/2014/main" id="{72D54881-EF76-3FB4-7F49-9F68C883D3E6}"/>
+              </a:ext>
+            </a:extLst>
+          </p:cNvPr>
+          <p:cNvCxnSpPr>
+            <a:cxnSpLocks/>
+          </p:cNvCxnSpPr>
+          <p:nvPr/>
+        </p:nvCxnSpPr>
+        <p:spPr>
+          <a:xfrm>
+            <a:off x="2048438" y="4337277"/>
+            <a:ext cx="968031" cy="0"/>
+          </a:xfrm>
+          <a:prstGeom prst="straightConnector1">
+            <a:avLst/>
+          </a:prstGeom>
+          <a:ln>
+            <a:solidFill>
+              <a:schemeClr val="bg1"/>
+            </a:solidFill>
+            <a:headEnd type="triangle"/>
+            <a:tailEnd type="triangle"/>
+          </a:ln>
+        </p:spPr>
+        <p:style>
+          <a:lnRef idx="2">
+            <a:schemeClr val="accent1"/>
+          </a:lnRef>
+          <a:fillRef idx="0">
+            <a:schemeClr val="accent1"/>
+          </a:fillRef>
+          <a:effectRef idx="1">
+            <a:schemeClr val="accent1"/>
+          </a:effectRef>
+          <a:fontRef idx="minor">
+            <a:schemeClr val="tx1"/>
+          </a:fontRef>
+        </p:style>
+      </p:cxnSp>
+      <p:pic>
+        <p:nvPicPr>
+          <p:cNvPr id="20" name="Graphic 19" descr="Ui Ux with solid fill">
+            <a:extLst>
+              <a:ext uri="{FF2B5EF4-FFF2-40B4-BE49-F238E27FC236}">
+                <a16:creationId xmlns:a16="http://schemas.microsoft.com/office/drawing/2014/main" id="{40FFBCED-C070-E231-EE7F-5A0FADE298D3}"/>
+              </a:ext>
+            </a:extLst>
+          </p:cNvPr>
+          <p:cNvPicPr>
+            <a:picLocks noChangeAspect="1"/>
+          </p:cNvPicPr>
+          <p:nvPr/>
+        </p:nvPicPr>
+        <p:blipFill>
+          <a:blip r:embed="rId8">
+            <a:extLst>
+              <a:ext uri="{96DAC541-7B7A-43D3-8B79-37D633B846F1}">
+                <asvg:svgBlip xmlns:asvg="http://schemas.microsoft.com/office/drawing/2016/SVG/main" r:embed="rId9"/>
+              </a:ext>
+            </a:extLst>
+          </a:blip>
+          <a:stretch>
+            <a:fillRect/>
+          </a:stretch>
+        </p:blipFill>
+        <p:spPr>
+          <a:xfrm>
+            <a:off x="590705" y="3755853"/>
+            <a:ext cx="1237130" cy="1237130"/>
+          </a:xfrm>
+          <a:prstGeom prst="rect">
+            <a:avLst/>
+          </a:prstGeom>
+        </p:spPr>
+      </p:pic>
+      <p:sp>
+        <p:nvSpPr>
+          <p:cNvPr id="21" name="TextBox 20">
+            <a:extLst>
+              <a:ext uri="{FF2B5EF4-FFF2-40B4-BE49-F238E27FC236}">
+                <a16:creationId xmlns:a16="http://schemas.microsoft.com/office/drawing/2014/main" id="{1F01A5C5-0B89-E6CB-F4E1-B08E3CFD65E9}"/>
+              </a:ext>
+            </a:extLst>
+          </p:cNvPr>
+          <p:cNvSpPr txBox="1"/>
+          <p:nvPr/>
+        </p:nvSpPr>
+        <p:spPr>
+          <a:xfrm>
+            <a:off x="241082" y="5071432"/>
+            <a:ext cx="1936376" cy="461665"/>
+          </a:xfrm>
+          <a:prstGeom prst="rect">
+            <a:avLst/>
+          </a:prstGeom>
+          <a:noFill/>
+        </p:spPr>
+        <p:txBody>
+          <a:bodyPr wrap="square" rtlCol="0">
+            <a:spAutoFit/>
+          </a:bodyPr>
+          <a:lstStyle/>
+          <a:p>
+            <a:pPr algn="ctr"/>
+            <a:r>
+              <a:rPr lang="en-US" sz="1200" dirty="0">
+                <a:solidFill>
+                  <a:schemeClr val="bg1"/>
+                </a:solidFill>
+                <a:latin typeface="Avenir Book" panose="02000503020000020003" pitchFamily="2" charset="0"/>
+              </a:rPr>
+              <a:t>Company C</a:t>
+            </a:r>
+          </a:p>
+          <a:p>
+            <a:pPr algn="ctr"/>
+            <a:r>
+              <a:rPr lang="en-US" sz="1200" dirty="0">
+                <a:solidFill>
+                  <a:schemeClr val="bg1"/>
+                </a:solidFill>
+                <a:latin typeface="Avenir Book" panose="02000503020000020003" pitchFamily="2" charset="0"/>
+              </a:rPr>
+              <a:t> Product UI</a:t>
+            </a:r>
+          </a:p>
+        </p:txBody>
+      </p:sp>
+      <p:sp>
+        <p:nvSpPr>
+          <p:cNvPr id="23" name="TextBox 22">
+            <a:extLst>
+              <a:ext uri="{FF2B5EF4-FFF2-40B4-BE49-F238E27FC236}">
+                <a16:creationId xmlns:a16="http://schemas.microsoft.com/office/drawing/2014/main" id="{D318F5F3-6AD4-2307-B87D-14F527462A8F}"/>
+              </a:ext>
+            </a:extLst>
+          </p:cNvPr>
+          <p:cNvSpPr txBox="1"/>
+          <p:nvPr/>
+        </p:nvSpPr>
+        <p:spPr>
+          <a:xfrm>
+            <a:off x="2532453" y="4778696"/>
+            <a:ext cx="1936376" cy="461665"/>
+          </a:xfrm>
+          <a:prstGeom prst="rect">
+            <a:avLst/>
+          </a:prstGeom>
+          <a:noFill/>
+        </p:spPr>
+        <p:txBody>
+          <a:bodyPr wrap="square" rtlCol="0">
+            <a:spAutoFit/>
+          </a:bodyPr>
+          <a:lstStyle/>
+          <a:p>
+            <a:pPr algn="ctr"/>
+            <a:r>
+              <a:rPr lang="en-US" sz="1200" dirty="0">
+                <a:solidFill>
+                  <a:schemeClr val="bg1"/>
+                </a:solidFill>
+                <a:latin typeface="Avenir Book" panose="02000503020000020003" pitchFamily="2" charset="0"/>
+              </a:rPr>
+              <a:t>Company C</a:t>
+            </a:r>
+          </a:p>
+          <a:p>
+            <a:pPr algn="ctr"/>
+            <a:r>
+              <a:rPr lang="en-US" sz="1200" dirty="0">
+                <a:solidFill>
+                  <a:schemeClr val="bg1"/>
+                </a:solidFill>
+                <a:latin typeface="Avenir Book" panose="02000503020000020003" pitchFamily="2" charset="0"/>
+              </a:rPr>
+              <a:t>Servers</a:t>
+            </a:r>
+          </a:p>
+        </p:txBody>
+      </p:sp>
+      <p:cxnSp>
+        <p:nvCxnSpPr>
+          <p:cNvPr id="27" name="Straight Arrow Connector 26">
+            <a:extLst>
+              <a:ext uri="{FF2B5EF4-FFF2-40B4-BE49-F238E27FC236}">
+                <a16:creationId xmlns:a16="http://schemas.microsoft.com/office/drawing/2014/main" id="{592D9CB1-6CB2-61DA-644E-95E101DC4E79}"/>
+              </a:ext>
+            </a:extLst>
+          </p:cNvPr>
+          <p:cNvCxnSpPr>
+            <a:cxnSpLocks/>
+          </p:cNvCxnSpPr>
+          <p:nvPr/>
+        </p:nvCxnSpPr>
+        <p:spPr>
+          <a:xfrm>
+            <a:off x="6331278" y="5709539"/>
+            <a:ext cx="691117" cy="0"/>
+          </a:xfrm>
+          <a:prstGeom prst="straightConnector1">
+            <a:avLst/>
+          </a:prstGeom>
+          <a:ln>
+            <a:solidFill>
+              <a:schemeClr val="bg1"/>
+            </a:solidFill>
+            <a:headEnd type="triangle"/>
+            <a:tailEnd type="triangle"/>
+          </a:ln>
+        </p:spPr>
+        <p:style>
+          <a:lnRef idx="2">
+            <a:schemeClr val="accent1"/>
+          </a:lnRef>
+          <a:fillRef idx="0">
+            <a:schemeClr val="accent1"/>
+          </a:fillRef>
+          <a:effectRef idx="1">
+            <a:schemeClr val="accent1"/>
+          </a:effectRef>
+          <a:fontRef idx="minor">
+            <a:schemeClr val="tx1"/>
+          </a:fontRef>
+        </p:style>
+      </p:cxnSp>
+      <p:pic>
+        <p:nvPicPr>
+          <p:cNvPr id="28" name="Graphic 27" descr="Artificial Intelligence with solid fill">
+            <a:extLst>
+              <a:ext uri="{FF2B5EF4-FFF2-40B4-BE49-F238E27FC236}">
+                <a16:creationId xmlns:a16="http://schemas.microsoft.com/office/drawing/2014/main" id="{EFDA2E69-44E4-9177-BB5D-A6A14CDDCDE8}"/>
+              </a:ext>
+            </a:extLst>
+          </p:cNvPr>
+          <p:cNvPicPr>
+            <a:picLocks noChangeAspect="1"/>
+          </p:cNvPicPr>
+          <p:nvPr/>
+        </p:nvPicPr>
+        <p:blipFill>
+          <a:blip r:embed="rId10">
+            <a:extLst>
+              <a:ext uri="{96DAC541-7B7A-43D3-8B79-37D633B846F1}">
+                <asvg:svgBlip xmlns:asvg="http://schemas.microsoft.com/office/drawing/2016/SVG/main" r:embed="rId11"/>
+              </a:ext>
+            </a:extLst>
+          </a:blip>
+          <a:stretch>
+            <a:fillRect/>
+          </a:stretch>
+        </p:blipFill>
+        <p:spPr>
+          <a:xfrm>
+            <a:off x="4755138" y="5129327"/>
+            <a:ext cx="549643" cy="549643"/>
+          </a:xfrm>
+          <a:prstGeom prst="rect">
+            <a:avLst/>
+          </a:prstGeom>
+        </p:spPr>
+      </p:pic>
+      <p:pic>
+        <p:nvPicPr>
+          <p:cNvPr id="30" name="Graphic 29" descr="Artificial Intelligence with solid fill">
+            <a:extLst>
+              <a:ext uri="{FF2B5EF4-FFF2-40B4-BE49-F238E27FC236}">
+                <a16:creationId xmlns:a16="http://schemas.microsoft.com/office/drawing/2014/main" id="{A773ED65-4570-73A8-3180-EF3555FC52BF}"/>
+              </a:ext>
+            </a:extLst>
+          </p:cNvPr>
+          <p:cNvPicPr>
+            <a:picLocks noChangeAspect="1"/>
+          </p:cNvPicPr>
+          <p:nvPr/>
+        </p:nvPicPr>
+        <p:blipFill>
+          <a:blip r:embed="rId10">
+            <a:extLst>
+              <a:ext uri="{96DAC541-7B7A-43D3-8B79-37D633B846F1}">
+                <asvg:svgBlip xmlns:asvg="http://schemas.microsoft.com/office/drawing/2016/SVG/main" r:embed="rId11"/>
+              </a:ext>
+            </a:extLst>
+          </a:blip>
+          <a:stretch>
+            <a:fillRect/>
+          </a:stretch>
+        </p:blipFill>
+        <p:spPr>
+          <a:xfrm>
+            <a:off x="4907538" y="5281727"/>
+            <a:ext cx="549643" cy="549643"/>
+          </a:xfrm>
+          <a:prstGeom prst="rect">
+            <a:avLst/>
+          </a:prstGeom>
+        </p:spPr>
+      </p:pic>
+      <p:sp>
+        <p:nvSpPr>
+          <p:cNvPr id="33" name="TextBox 32">
+            <a:extLst>
+              <a:ext uri="{FF2B5EF4-FFF2-40B4-BE49-F238E27FC236}">
+                <a16:creationId xmlns:a16="http://schemas.microsoft.com/office/drawing/2014/main" id="{FB3AE578-D14E-08C3-F33F-F3747FEF4A86}"/>
+              </a:ext>
+            </a:extLst>
+          </p:cNvPr>
+          <p:cNvSpPr txBox="1"/>
+          <p:nvPr/>
+        </p:nvSpPr>
+        <p:spPr>
+          <a:xfrm>
+            <a:off x="4613642" y="5917802"/>
+            <a:ext cx="1248416" cy="461665"/>
+          </a:xfrm>
+          <a:prstGeom prst="rect">
+            <a:avLst/>
+          </a:prstGeom>
+          <a:noFill/>
+        </p:spPr>
+        <p:txBody>
+          <a:bodyPr wrap="square" rtlCol="0">
+            <a:spAutoFit/>
+          </a:bodyPr>
+          <a:lstStyle/>
+          <a:p>
+            <a:pPr algn="ctr"/>
+            <a:r>
+              <a:rPr lang="en-US" sz="1200" dirty="0">
+                <a:solidFill>
+                  <a:schemeClr val="bg1"/>
+                </a:solidFill>
+                <a:latin typeface="Avenir Book" panose="02000503020000020003" pitchFamily="2" charset="0"/>
+              </a:rPr>
+              <a:t>Company C</a:t>
+            </a:r>
+          </a:p>
+          <a:p>
+            <a:pPr algn="ctr"/>
+            <a:r>
+              <a:rPr lang="en-US" sz="1200" dirty="0">
+                <a:solidFill>
+                  <a:schemeClr val="bg1"/>
+                </a:solidFill>
+                <a:latin typeface="Avenir Book" panose="02000503020000020003" pitchFamily="2" charset="0"/>
+              </a:rPr>
+              <a:t> AI Agents</a:t>
+            </a:r>
+          </a:p>
+        </p:txBody>
+      </p:sp>
+      <p:sp>
+        <p:nvSpPr>
+          <p:cNvPr id="34" name="Rounded Rectangle 33">
+            <a:extLst>
+              <a:ext uri="{FF2B5EF4-FFF2-40B4-BE49-F238E27FC236}">
+                <a16:creationId xmlns:a16="http://schemas.microsoft.com/office/drawing/2014/main" id="{5E3ED3EA-4443-3624-94DD-FC0B30E5DBC3}"/>
+              </a:ext>
+            </a:extLst>
+          </p:cNvPr>
+          <p:cNvSpPr/>
+          <p:nvPr/>
+        </p:nvSpPr>
+        <p:spPr>
+          <a:xfrm rot="5400000">
+            <a:off x="5265093" y="5488152"/>
+            <a:ext cx="1514417" cy="410995"/>
+          </a:xfrm>
+          <a:prstGeom prst="roundRect">
+            <a:avLst/>
+          </a:prstGeom>
+          <a:noFill/>
+          <a:ln>
+            <a:solidFill>
+              <a:schemeClr val="bg1"/>
+            </a:solidFill>
+          </a:ln>
+        </p:spPr>
+        <p:style>
+          <a:lnRef idx="2">
+            <a:schemeClr val="accent1">
+              <a:shade val="15000"/>
+            </a:schemeClr>
+          </a:lnRef>
+          <a:fillRef idx="1">
+            <a:schemeClr val="accent1"/>
+          </a:fillRef>
+          <a:effectRef idx="0">
+            <a:schemeClr val="accent1"/>
+          </a:effectRef>
+          <a:fontRef idx="minor">
+            <a:schemeClr val="lt1"/>
+          </a:fontRef>
+        </p:style>
+        <p:txBody>
+          <a:bodyPr rtlCol="0" anchor="ctr"/>
+          <a:lstStyle/>
+          <a:p>
+            <a:pPr algn="ctr"/>
+            <a:r>
+              <a:rPr lang="en-US" dirty="0">
+                <a:solidFill>
+                  <a:schemeClr val="bg1"/>
+                </a:solidFill>
+              </a:rPr>
+              <a:t>Lib </a:t>
+            </a:r>
+          </a:p>
+        </p:txBody>
+      </p:sp>
+    </p:spTree>
+    <p:extLst>
+      <p:ext uri="{BB962C8B-B14F-4D97-AF65-F5344CB8AC3E}">
+        <p14:creationId xmlns:p14="http://schemas.microsoft.com/office/powerpoint/2010/main" val="3872688988"/>
+      </p:ext>
+    </p:extLst>
+  </p:cSld>
+  <p:clrMapOvr>
+    <a:masterClrMapping/>
+  </p:clrMapOvr>
+</p:sld>
+</file>
+
+<file path=ppt/slides/slide7.xml><?xml version="1.0" encoding="utf-8"?>
+<p:sld xmlns:a="http://schemas.openxmlformats.org/drawingml/2006/main" xmlns:r="http://schemas.openxmlformats.org/officeDocument/2006/relationships" xmlns:p="http://schemas.openxmlformats.org/presentationml/2006/main">
+  <p:cSld>
+    <p:bg>
+      <p:bgPr>
+        <a:solidFill>
+          <a:schemeClr val="tx1">
+            <a:lumMod val="85000"/>
+            <a:lumOff val="15000"/>
+          </a:schemeClr>
+        </a:solidFill>
+        <a:effectLst/>
+      </p:bgPr>
+    </p:bg>
+    <p:spTree>
+      <p:nvGrpSpPr>
+        <p:cNvPr id="1" name="">
+          <a:extLst>
+            <a:ext uri="{FF2B5EF4-FFF2-40B4-BE49-F238E27FC236}">
+              <a16:creationId xmlns:a16="http://schemas.microsoft.com/office/drawing/2014/main" id="{F9EE088F-502F-034A-09D2-6654C4925BF3}"/>
+            </a:ext>
+          </a:extLst>
+        </p:cNvPr>
+        <p:cNvGrpSpPr/>
+        <p:nvPr/>
+      </p:nvGrpSpPr>
+      <p:grpSpPr>
+        <a:xfrm>
+          <a:off x="0" y="0"/>
+          <a:ext cx="0" cy="0"/>
+          <a:chOff x="0" y="0"/>
+          <a:chExt cx="0" cy="0"/>
+        </a:xfrm>
+      </p:grpSpPr>
+      <p:pic>
+        <p:nvPicPr>
+          <p:cNvPr id="12" name="Graphic 11" descr="Server with solid fill">
+            <a:extLst>
+              <a:ext uri="{FF2B5EF4-FFF2-40B4-BE49-F238E27FC236}">
+                <a16:creationId xmlns:a16="http://schemas.microsoft.com/office/drawing/2014/main" id="{C86D9664-3FDD-B496-7E10-E85B608D1D2D}"/>
+              </a:ext>
+            </a:extLst>
+          </p:cNvPr>
+          <p:cNvPicPr>
+            <a:picLocks noChangeAspect="1"/>
+          </p:cNvPicPr>
+          <p:nvPr/>
+        </p:nvPicPr>
+        <p:blipFill>
+          <a:blip r:embed="rId2">
+            <a:extLst>
+              <a:ext uri="{96DAC541-7B7A-43D3-8B79-37D633B846F1}">
+                <asvg:svgBlip xmlns:asvg="http://schemas.microsoft.com/office/drawing/2016/SVG/main" r:embed="rId3"/>
+              </a:ext>
+            </a:extLst>
+          </a:blip>
+          <a:stretch>
+            <a:fillRect/>
+          </a:stretch>
+        </p:blipFill>
+        <p:spPr>
+          <a:xfrm>
+            <a:off x="7664393" y="3233071"/>
+            <a:ext cx="926974" cy="926974"/>
+          </a:xfrm>
+          <a:prstGeom prst="rect">
+            <a:avLst/>
+          </a:prstGeom>
+        </p:spPr>
+      </p:pic>
+      <p:sp>
+        <p:nvSpPr>
+          <p:cNvPr id="15" name="TextBox 14">
+            <a:extLst>
+              <a:ext uri="{FF2B5EF4-FFF2-40B4-BE49-F238E27FC236}">
+                <a16:creationId xmlns:a16="http://schemas.microsoft.com/office/drawing/2014/main" id="{E7E47620-AAA3-A66B-E9D8-A5FAC17082EC}"/>
+              </a:ext>
+            </a:extLst>
+          </p:cNvPr>
+          <p:cNvSpPr txBox="1"/>
+          <p:nvPr/>
+        </p:nvSpPr>
+        <p:spPr>
+          <a:xfrm>
+            <a:off x="7276915" y="4140195"/>
+            <a:ext cx="1757193" cy="923330"/>
+          </a:xfrm>
+          <a:prstGeom prst="rect">
+            <a:avLst/>
+          </a:prstGeom>
+          <a:noFill/>
+        </p:spPr>
+        <p:txBody>
+          <a:bodyPr wrap="square" rtlCol="0">
+            <a:spAutoFit/>
+          </a:bodyPr>
+          <a:lstStyle/>
+          <a:p>
+            <a:pPr algn="ctr"/>
+            <a:r>
+              <a:rPr lang="en-US" dirty="0">
+                <a:solidFill>
+                  <a:schemeClr val="bg1"/>
+                </a:solidFill>
+                <a:latin typeface="Avenir Book" panose="02000503020000020003" pitchFamily="2" charset="0"/>
+              </a:rPr>
+              <a:t>Company C</a:t>
+            </a:r>
+          </a:p>
+          <a:p>
+            <a:pPr algn="ctr"/>
+            <a:r>
+              <a:rPr lang="en-US" dirty="0">
+                <a:solidFill>
+                  <a:schemeClr val="bg1"/>
+                </a:solidFill>
+                <a:latin typeface="Avenir Book" panose="02000503020000020003" pitchFamily="2" charset="0"/>
+              </a:rPr>
+              <a:t> platform server</a:t>
+            </a:r>
+          </a:p>
+        </p:txBody>
+      </p:sp>
+      <p:sp>
+        <p:nvSpPr>
+          <p:cNvPr id="9" name="Rounded Rectangle 8">
+            <a:extLst>
+              <a:ext uri="{FF2B5EF4-FFF2-40B4-BE49-F238E27FC236}">
+                <a16:creationId xmlns:a16="http://schemas.microsoft.com/office/drawing/2014/main" id="{502DD6B0-10D0-B182-6C63-B29AE9D53DC4}"/>
+              </a:ext>
+            </a:extLst>
+          </p:cNvPr>
+          <p:cNvSpPr/>
+          <p:nvPr/>
+        </p:nvSpPr>
+        <p:spPr>
+          <a:xfrm>
+            <a:off x="7455747" y="1791026"/>
+            <a:ext cx="1380618" cy="662275"/>
+          </a:xfrm>
+          <a:prstGeom prst="roundRect">
+            <a:avLst/>
+          </a:prstGeom>
+          <a:noFill/>
+          <a:ln>
+            <a:solidFill>
+              <a:schemeClr val="bg1"/>
+            </a:solidFill>
+          </a:ln>
+        </p:spPr>
+        <p:style>
+          <a:lnRef idx="2">
+            <a:schemeClr val="accent1">
+              <a:shade val="15000"/>
+            </a:schemeClr>
+          </a:lnRef>
+          <a:fillRef idx="1">
+            <a:schemeClr val="accent1"/>
+          </a:fillRef>
+          <a:effectRef idx="0">
+            <a:schemeClr val="accent1"/>
+          </a:effectRef>
+          <a:fontRef idx="minor">
+            <a:schemeClr val="lt1"/>
+          </a:fontRef>
+        </p:style>
+        <p:txBody>
+          <a:bodyPr rtlCol="0" anchor="ctr"/>
+          <a:lstStyle/>
+          <a:p>
+            <a:pPr algn="ctr"/>
+            <a:r>
+              <a:rPr lang="en-US" dirty="0">
+                <a:solidFill>
+                  <a:schemeClr val="bg1"/>
+                </a:solidFill>
+              </a:rPr>
+              <a:t>Com C Dev Portal</a:t>
+            </a:r>
+          </a:p>
+        </p:txBody>
+      </p:sp>
+      <p:cxnSp>
+        <p:nvCxnSpPr>
+          <p:cNvPr id="11" name="Straight Arrow Connector 10">
+            <a:extLst>
+              <a:ext uri="{FF2B5EF4-FFF2-40B4-BE49-F238E27FC236}">
+                <a16:creationId xmlns:a16="http://schemas.microsoft.com/office/drawing/2014/main" id="{51664A25-C9BB-5B98-3A5B-E9300916781A}"/>
+              </a:ext>
+            </a:extLst>
+          </p:cNvPr>
+          <p:cNvCxnSpPr>
+            <a:cxnSpLocks/>
+          </p:cNvCxnSpPr>
+          <p:nvPr/>
+        </p:nvCxnSpPr>
+        <p:spPr>
+          <a:xfrm>
+            <a:off x="8142838" y="2536875"/>
+            <a:ext cx="0" cy="483541"/>
+          </a:xfrm>
+          <a:prstGeom prst="straightConnector1">
+            <a:avLst/>
+          </a:prstGeom>
+          <a:ln>
+            <a:solidFill>
+              <a:schemeClr val="tx2">
+                <a:lumMod val="25000"/>
+                <a:lumOff val="75000"/>
+              </a:schemeClr>
+            </a:solidFill>
+            <a:headEnd type="triangle"/>
+            <a:tailEnd type="triangle"/>
+          </a:ln>
+        </p:spPr>
+        <p:style>
+          <a:lnRef idx="2">
+            <a:schemeClr val="accent1"/>
+          </a:lnRef>
+          <a:fillRef idx="0">
+            <a:schemeClr val="accent1"/>
+          </a:fillRef>
+          <a:effectRef idx="1">
+            <a:schemeClr val="accent1"/>
+          </a:effectRef>
+          <a:fontRef idx="minor">
+            <a:schemeClr val="tx1"/>
+          </a:fontRef>
+        </p:style>
+      </p:cxnSp>
+      <p:sp>
+        <p:nvSpPr>
+          <p:cNvPr id="29" name="Rounded Rectangle 28">
+            <a:extLst>
+              <a:ext uri="{FF2B5EF4-FFF2-40B4-BE49-F238E27FC236}">
+                <a16:creationId xmlns:a16="http://schemas.microsoft.com/office/drawing/2014/main" id="{10512EB5-6FCE-B098-B135-79395C943919}"/>
+              </a:ext>
+            </a:extLst>
+          </p:cNvPr>
+          <p:cNvSpPr/>
+          <p:nvPr/>
+        </p:nvSpPr>
+        <p:spPr>
+          <a:xfrm>
+            <a:off x="7276915" y="3108196"/>
+            <a:ext cx="1757193" cy="3250559"/>
+          </a:xfrm>
+          <a:prstGeom prst="roundRect">
+            <a:avLst>
+              <a:gd name="adj" fmla="val 6608"/>
+            </a:avLst>
+          </a:prstGeom>
+          <a:noFill/>
+          <a:ln>
+            <a:solidFill>
+              <a:schemeClr val="bg1"/>
+            </a:solidFill>
+          </a:ln>
+        </p:spPr>
+        <p:style>
+          <a:lnRef idx="2">
+            <a:schemeClr val="accent1">
+              <a:shade val="15000"/>
+            </a:schemeClr>
+          </a:lnRef>
+          <a:fillRef idx="1">
+            <a:schemeClr val="accent1"/>
+          </a:fillRef>
+          <a:effectRef idx="0">
+            <a:schemeClr val="accent1"/>
+          </a:effectRef>
+          <a:fontRef idx="minor">
+            <a:schemeClr val="lt1"/>
+          </a:fontRef>
+        </p:style>
+        <p:txBody>
+          <a:bodyPr rtlCol="0" anchor="ctr"/>
+          <a:lstStyle/>
+          <a:p>
+            <a:pPr algn="ctr"/>
+            <a:endParaRPr lang="en-US" dirty="0">
+              <a:solidFill>
+                <a:schemeClr val="bg1"/>
+              </a:solidFill>
+            </a:endParaRPr>
+          </a:p>
+        </p:txBody>
+      </p:sp>
+      <p:pic>
+        <p:nvPicPr>
+          <p:cNvPr id="10" name="Graphic 9" descr="Server outline">
+            <a:extLst>
+              <a:ext uri="{FF2B5EF4-FFF2-40B4-BE49-F238E27FC236}">
+                <a16:creationId xmlns:a16="http://schemas.microsoft.com/office/drawing/2014/main" id="{5A6ED260-3A10-9CE1-510E-B40C33D82146}"/>
+              </a:ext>
+            </a:extLst>
+          </p:cNvPr>
+          <p:cNvPicPr>
+            <a:picLocks noChangeAspect="1"/>
+          </p:cNvPicPr>
+          <p:nvPr/>
+        </p:nvPicPr>
+        <p:blipFill>
+          <a:blip r:embed="rId4">
+            <a:extLst>
+              <a:ext uri="{96DAC541-7B7A-43D3-8B79-37D633B846F1}">
+                <asvg:svgBlip xmlns:asvg="http://schemas.microsoft.com/office/drawing/2016/SVG/main" r:embed="rId5"/>
+              </a:ext>
+            </a:extLst>
+          </a:blip>
+          <a:stretch>
+            <a:fillRect/>
+          </a:stretch>
+        </p:blipFill>
+        <p:spPr>
+          <a:xfrm>
+            <a:off x="3116539" y="3977377"/>
+            <a:ext cx="795797" cy="795797"/>
+          </a:xfrm>
+          <a:prstGeom prst="rect">
+            <a:avLst/>
+          </a:prstGeom>
+        </p:spPr>
+      </p:pic>
+      <p:cxnSp>
+        <p:nvCxnSpPr>
+          <p:cNvPr id="13" name="Straight Arrow Connector 12">
+            <a:extLst>
+              <a:ext uri="{FF2B5EF4-FFF2-40B4-BE49-F238E27FC236}">
+                <a16:creationId xmlns:a16="http://schemas.microsoft.com/office/drawing/2014/main" id="{32B6B7E2-C291-5B57-9294-2D008236B976}"/>
+              </a:ext>
+            </a:extLst>
+          </p:cNvPr>
+          <p:cNvCxnSpPr>
+            <a:cxnSpLocks/>
+          </p:cNvCxnSpPr>
+          <p:nvPr/>
+        </p:nvCxnSpPr>
+        <p:spPr>
+          <a:xfrm>
+            <a:off x="4159592" y="4321269"/>
+            <a:ext cx="2900427" cy="0"/>
+          </a:xfrm>
+          <a:prstGeom prst="straightConnector1">
+            <a:avLst/>
+          </a:prstGeom>
+          <a:ln>
+            <a:solidFill>
+              <a:schemeClr val="bg1"/>
+            </a:solidFill>
+            <a:headEnd type="triangle"/>
+            <a:tailEnd type="triangle"/>
+          </a:ln>
+        </p:spPr>
+        <p:style>
+          <a:lnRef idx="2">
+            <a:schemeClr val="accent1"/>
+          </a:lnRef>
+          <a:fillRef idx="0">
+            <a:schemeClr val="accent1"/>
+          </a:fillRef>
+          <a:effectRef idx="1">
+            <a:schemeClr val="accent1"/>
+          </a:effectRef>
+          <a:fontRef idx="minor">
+            <a:schemeClr val="tx1"/>
+          </a:fontRef>
+        </p:style>
+      </p:cxnSp>
+      <p:cxnSp>
+        <p:nvCxnSpPr>
+          <p:cNvPr id="17" name="Straight Arrow Connector 16">
+            <a:extLst>
+              <a:ext uri="{FF2B5EF4-FFF2-40B4-BE49-F238E27FC236}">
+                <a16:creationId xmlns:a16="http://schemas.microsoft.com/office/drawing/2014/main" id="{4AC612DD-4889-37B2-57D4-9B4311612003}"/>
+              </a:ext>
+            </a:extLst>
+          </p:cNvPr>
+          <p:cNvCxnSpPr>
+            <a:cxnSpLocks/>
+          </p:cNvCxnSpPr>
+          <p:nvPr/>
+        </p:nvCxnSpPr>
+        <p:spPr>
+          <a:xfrm>
+            <a:off x="2048438" y="4337277"/>
+            <a:ext cx="968031" cy="0"/>
+          </a:xfrm>
+          <a:prstGeom prst="straightConnector1">
+            <a:avLst/>
+          </a:prstGeom>
+          <a:ln>
+            <a:solidFill>
+              <a:schemeClr val="bg1"/>
+            </a:solidFill>
+            <a:headEnd type="triangle"/>
+            <a:tailEnd type="triangle"/>
+          </a:ln>
+        </p:spPr>
+        <p:style>
+          <a:lnRef idx="2">
+            <a:schemeClr val="accent1"/>
+          </a:lnRef>
+          <a:fillRef idx="0">
+            <a:schemeClr val="accent1"/>
+          </a:fillRef>
+          <a:effectRef idx="1">
+            <a:schemeClr val="accent1"/>
+          </a:effectRef>
+          <a:fontRef idx="minor">
+            <a:schemeClr val="tx1"/>
+          </a:fontRef>
+        </p:style>
+      </p:cxnSp>
+      <p:pic>
+        <p:nvPicPr>
+          <p:cNvPr id="20" name="Graphic 19" descr="Ui Ux with solid fill">
+            <a:extLst>
+              <a:ext uri="{FF2B5EF4-FFF2-40B4-BE49-F238E27FC236}">
+                <a16:creationId xmlns:a16="http://schemas.microsoft.com/office/drawing/2014/main" id="{3F11FF5F-AE7F-CABE-C94C-3E6F2B9E95EE}"/>
+              </a:ext>
+            </a:extLst>
+          </p:cNvPr>
+          <p:cNvPicPr>
+            <a:picLocks noChangeAspect="1"/>
+          </p:cNvPicPr>
+          <p:nvPr/>
+        </p:nvPicPr>
+        <p:blipFill>
+          <a:blip r:embed="rId6">
+            <a:extLst>
+              <a:ext uri="{96DAC541-7B7A-43D3-8B79-37D633B846F1}">
+                <asvg:svgBlip xmlns:asvg="http://schemas.microsoft.com/office/drawing/2016/SVG/main" r:embed="rId7"/>
+              </a:ext>
+            </a:extLst>
+          </a:blip>
+          <a:stretch>
+            <a:fillRect/>
+          </a:stretch>
+        </p:blipFill>
+        <p:spPr>
+          <a:xfrm>
+            <a:off x="590705" y="3755853"/>
+            <a:ext cx="1237130" cy="1237130"/>
+          </a:xfrm>
+          <a:prstGeom prst="rect">
+            <a:avLst/>
+          </a:prstGeom>
+        </p:spPr>
+      </p:pic>
+      <p:sp>
+        <p:nvSpPr>
+          <p:cNvPr id="21" name="TextBox 20">
+            <a:extLst>
+              <a:ext uri="{FF2B5EF4-FFF2-40B4-BE49-F238E27FC236}">
+                <a16:creationId xmlns:a16="http://schemas.microsoft.com/office/drawing/2014/main" id="{6C6F876C-005B-D763-4012-B1B1866D10E4}"/>
+              </a:ext>
+            </a:extLst>
+          </p:cNvPr>
+          <p:cNvSpPr txBox="1"/>
+          <p:nvPr/>
+        </p:nvSpPr>
+        <p:spPr>
+          <a:xfrm>
+            <a:off x="241082" y="5071432"/>
+            <a:ext cx="1936376" cy="461665"/>
+          </a:xfrm>
+          <a:prstGeom prst="rect">
+            <a:avLst/>
+          </a:prstGeom>
+          <a:noFill/>
+        </p:spPr>
+        <p:txBody>
+          <a:bodyPr wrap="square" rtlCol="0">
+            <a:spAutoFit/>
+          </a:bodyPr>
+          <a:lstStyle/>
+          <a:p>
+            <a:pPr algn="ctr"/>
+            <a:r>
+              <a:rPr lang="en-US" sz="1200" dirty="0">
+                <a:solidFill>
+                  <a:schemeClr val="bg1"/>
+                </a:solidFill>
+                <a:latin typeface="Avenir Book" panose="02000503020000020003" pitchFamily="2" charset="0"/>
+              </a:rPr>
+              <a:t>Company C</a:t>
+            </a:r>
+          </a:p>
+          <a:p>
+            <a:pPr algn="ctr"/>
+            <a:r>
+              <a:rPr lang="en-US" sz="1200" dirty="0">
+                <a:solidFill>
+                  <a:schemeClr val="bg1"/>
+                </a:solidFill>
+                <a:latin typeface="Avenir Book" panose="02000503020000020003" pitchFamily="2" charset="0"/>
+              </a:rPr>
+              <a:t> Product UI</a:t>
+            </a:r>
+          </a:p>
+        </p:txBody>
+      </p:sp>
+      <p:sp>
+        <p:nvSpPr>
+          <p:cNvPr id="23" name="TextBox 22">
+            <a:extLst>
+              <a:ext uri="{FF2B5EF4-FFF2-40B4-BE49-F238E27FC236}">
+                <a16:creationId xmlns:a16="http://schemas.microsoft.com/office/drawing/2014/main" id="{F70AB05B-A716-67CE-64CA-18EE25A3E0EA}"/>
+              </a:ext>
+            </a:extLst>
+          </p:cNvPr>
+          <p:cNvSpPr txBox="1"/>
+          <p:nvPr/>
+        </p:nvSpPr>
+        <p:spPr>
+          <a:xfrm>
+            <a:off x="2532453" y="4778696"/>
+            <a:ext cx="1936376" cy="461665"/>
+          </a:xfrm>
+          <a:prstGeom prst="rect">
+            <a:avLst/>
+          </a:prstGeom>
+          <a:noFill/>
+        </p:spPr>
+        <p:txBody>
+          <a:bodyPr wrap="square" rtlCol="0">
+            <a:spAutoFit/>
+          </a:bodyPr>
+          <a:lstStyle/>
+          <a:p>
+            <a:pPr algn="ctr"/>
+            <a:r>
+              <a:rPr lang="en-US" sz="1200" dirty="0">
+                <a:solidFill>
+                  <a:schemeClr val="bg1"/>
+                </a:solidFill>
+                <a:latin typeface="Avenir Book" panose="02000503020000020003" pitchFamily="2" charset="0"/>
+              </a:rPr>
+              <a:t>Company C</a:t>
+            </a:r>
+          </a:p>
+          <a:p>
+            <a:pPr algn="ctr"/>
+            <a:r>
+              <a:rPr lang="en-US" sz="1200" dirty="0">
+                <a:solidFill>
+                  <a:schemeClr val="bg1"/>
+                </a:solidFill>
+                <a:latin typeface="Avenir Book" panose="02000503020000020003" pitchFamily="2" charset="0"/>
+              </a:rPr>
+              <a:t>Servers</a:t>
+            </a:r>
+          </a:p>
+        </p:txBody>
+      </p:sp>
+      <p:cxnSp>
+        <p:nvCxnSpPr>
+          <p:cNvPr id="27" name="Straight Arrow Connector 26">
+            <a:extLst>
+              <a:ext uri="{FF2B5EF4-FFF2-40B4-BE49-F238E27FC236}">
+                <a16:creationId xmlns:a16="http://schemas.microsoft.com/office/drawing/2014/main" id="{2FC353E1-F7FB-04F1-AC2F-3570B05B74AF}"/>
+              </a:ext>
+            </a:extLst>
+          </p:cNvPr>
+          <p:cNvCxnSpPr>
+            <a:cxnSpLocks/>
+          </p:cNvCxnSpPr>
+          <p:nvPr/>
+        </p:nvCxnSpPr>
+        <p:spPr>
+          <a:xfrm>
+            <a:off x="6331278" y="5709539"/>
+            <a:ext cx="691117" cy="0"/>
+          </a:xfrm>
+          <a:prstGeom prst="straightConnector1">
+            <a:avLst/>
+          </a:prstGeom>
+          <a:ln>
+            <a:solidFill>
+              <a:schemeClr val="bg1"/>
+            </a:solidFill>
+            <a:headEnd type="triangle"/>
+            <a:tailEnd type="triangle"/>
+          </a:ln>
+        </p:spPr>
+        <p:style>
+          <a:lnRef idx="2">
+            <a:schemeClr val="accent1"/>
+          </a:lnRef>
+          <a:fillRef idx="0">
+            <a:schemeClr val="accent1"/>
+          </a:fillRef>
+          <a:effectRef idx="1">
+            <a:schemeClr val="accent1"/>
+          </a:effectRef>
+          <a:fontRef idx="minor">
+            <a:schemeClr val="tx1"/>
+          </a:fontRef>
+        </p:style>
+      </p:cxnSp>
+      <p:pic>
+        <p:nvPicPr>
+          <p:cNvPr id="28" name="Graphic 27" descr="Artificial Intelligence with solid fill">
+            <a:extLst>
+              <a:ext uri="{FF2B5EF4-FFF2-40B4-BE49-F238E27FC236}">
+                <a16:creationId xmlns:a16="http://schemas.microsoft.com/office/drawing/2014/main" id="{04C7DAB7-5008-A22C-A3A2-E88557907E2B}"/>
+              </a:ext>
+            </a:extLst>
+          </p:cNvPr>
+          <p:cNvPicPr>
+            <a:picLocks noChangeAspect="1"/>
+          </p:cNvPicPr>
+          <p:nvPr/>
+        </p:nvPicPr>
+        <p:blipFill>
+          <a:blip r:embed="rId8">
+            <a:extLst>
+              <a:ext uri="{96DAC541-7B7A-43D3-8B79-37D633B846F1}">
+                <asvg:svgBlip xmlns:asvg="http://schemas.microsoft.com/office/drawing/2016/SVG/main" r:embed="rId9"/>
+              </a:ext>
+            </a:extLst>
+          </a:blip>
+          <a:stretch>
+            <a:fillRect/>
+          </a:stretch>
+        </p:blipFill>
+        <p:spPr>
+          <a:xfrm>
+            <a:off x="4755138" y="5129327"/>
+            <a:ext cx="549643" cy="549643"/>
+          </a:xfrm>
+          <a:prstGeom prst="rect">
+            <a:avLst/>
+          </a:prstGeom>
+        </p:spPr>
+      </p:pic>
+      <p:pic>
+        <p:nvPicPr>
+          <p:cNvPr id="30" name="Graphic 29" descr="Artificial Intelligence with solid fill">
+            <a:extLst>
+              <a:ext uri="{FF2B5EF4-FFF2-40B4-BE49-F238E27FC236}">
+                <a16:creationId xmlns:a16="http://schemas.microsoft.com/office/drawing/2014/main" id="{B2DB9B10-F92A-9548-5E78-CDA550ECA70E}"/>
+              </a:ext>
+            </a:extLst>
+          </p:cNvPr>
+          <p:cNvPicPr>
+            <a:picLocks noChangeAspect="1"/>
+          </p:cNvPicPr>
+          <p:nvPr/>
+        </p:nvPicPr>
+        <p:blipFill>
+          <a:blip r:embed="rId8">
+            <a:extLst>
+              <a:ext uri="{96DAC541-7B7A-43D3-8B79-37D633B846F1}">
+                <asvg:svgBlip xmlns:asvg="http://schemas.microsoft.com/office/drawing/2016/SVG/main" r:embed="rId9"/>
+              </a:ext>
+            </a:extLst>
+          </a:blip>
+          <a:stretch>
+            <a:fillRect/>
+          </a:stretch>
+        </p:blipFill>
+        <p:spPr>
+          <a:xfrm>
+            <a:off x="4907538" y="5281727"/>
+            <a:ext cx="549643" cy="549643"/>
+          </a:xfrm>
+          <a:prstGeom prst="rect">
+            <a:avLst/>
+          </a:prstGeom>
+        </p:spPr>
+      </p:pic>
+      <p:sp>
+        <p:nvSpPr>
+          <p:cNvPr id="33" name="TextBox 32">
+            <a:extLst>
+              <a:ext uri="{FF2B5EF4-FFF2-40B4-BE49-F238E27FC236}">
+                <a16:creationId xmlns:a16="http://schemas.microsoft.com/office/drawing/2014/main" id="{F516B651-8660-68BD-15C3-C1AE4B0F2272}"/>
+              </a:ext>
+            </a:extLst>
+          </p:cNvPr>
+          <p:cNvSpPr txBox="1"/>
+          <p:nvPr/>
+        </p:nvSpPr>
+        <p:spPr>
+          <a:xfrm>
+            <a:off x="4613642" y="5917802"/>
+            <a:ext cx="1248416" cy="461665"/>
+          </a:xfrm>
+          <a:prstGeom prst="rect">
+            <a:avLst/>
+          </a:prstGeom>
+          <a:noFill/>
+        </p:spPr>
+        <p:txBody>
+          <a:bodyPr wrap="square" rtlCol="0">
+            <a:spAutoFit/>
+          </a:bodyPr>
+          <a:lstStyle/>
+          <a:p>
+            <a:pPr algn="ctr"/>
+            <a:r>
+              <a:rPr lang="en-US" sz="1200" dirty="0">
+                <a:solidFill>
+                  <a:schemeClr val="bg1"/>
+                </a:solidFill>
+                <a:latin typeface="Avenir Book" panose="02000503020000020003" pitchFamily="2" charset="0"/>
+              </a:rPr>
+              <a:t>Company C</a:t>
+            </a:r>
+          </a:p>
+          <a:p>
+            <a:pPr algn="ctr"/>
+            <a:r>
+              <a:rPr lang="en-US" sz="1200" dirty="0">
+                <a:solidFill>
+                  <a:schemeClr val="bg1"/>
+                </a:solidFill>
+                <a:latin typeface="Avenir Book" panose="02000503020000020003" pitchFamily="2" charset="0"/>
+              </a:rPr>
+              <a:t> AI Agents</a:t>
+            </a:r>
+          </a:p>
+        </p:txBody>
+      </p:sp>
+      <p:sp>
+        <p:nvSpPr>
+          <p:cNvPr id="34" name="Rounded Rectangle 33">
+            <a:extLst>
+              <a:ext uri="{FF2B5EF4-FFF2-40B4-BE49-F238E27FC236}">
+                <a16:creationId xmlns:a16="http://schemas.microsoft.com/office/drawing/2014/main" id="{6AAF98F0-199A-7DF8-E7C1-89870E8A490E}"/>
+              </a:ext>
+            </a:extLst>
+          </p:cNvPr>
+          <p:cNvSpPr/>
+          <p:nvPr/>
+        </p:nvSpPr>
+        <p:spPr>
+          <a:xfrm rot="5400000">
+            <a:off x="5265093" y="5488152"/>
+            <a:ext cx="1514417" cy="410995"/>
+          </a:xfrm>
+          <a:prstGeom prst="roundRect">
+            <a:avLst/>
+          </a:prstGeom>
+          <a:noFill/>
+          <a:ln>
+            <a:solidFill>
+              <a:schemeClr val="bg1"/>
+            </a:solidFill>
+          </a:ln>
+        </p:spPr>
+        <p:style>
+          <a:lnRef idx="2">
+            <a:schemeClr val="accent1">
+              <a:shade val="15000"/>
+            </a:schemeClr>
+          </a:lnRef>
+          <a:fillRef idx="1">
+            <a:schemeClr val="accent1"/>
+          </a:fillRef>
+          <a:effectRef idx="0">
+            <a:schemeClr val="accent1"/>
+          </a:effectRef>
+          <a:fontRef idx="minor">
+            <a:schemeClr val="lt1"/>
+          </a:fontRef>
+        </p:style>
+        <p:txBody>
+          <a:bodyPr rtlCol="0" anchor="ctr"/>
+          <a:lstStyle/>
+          <a:p>
+            <a:pPr algn="ctr"/>
+            <a:r>
+              <a:rPr lang="en-US" dirty="0">
+                <a:solidFill>
+                  <a:schemeClr val="bg1"/>
+                </a:solidFill>
+              </a:rPr>
+              <a:t>Lib </a:t>
+            </a:r>
+          </a:p>
+        </p:txBody>
+      </p:sp>
+    </p:spTree>
+    <p:extLst>
+      <p:ext uri="{BB962C8B-B14F-4D97-AF65-F5344CB8AC3E}">
+        <p14:creationId xmlns:p14="http://schemas.microsoft.com/office/powerpoint/2010/main" val="2900182802"/>
       </p:ext>
     </p:extLst>
   </p:cSld>

</xml_diff>